<commit_message>
Make HighlightBullets test stricter by adding background
</commit_message>
<xml_diff>
--- a/doc/test/HighlightPoints.pptx
+++ b/doc/test/HighlightPoints.pptx
@@ -263,7 +263,7 @@
           <a:p>
             <a:fld id="{7B6B14F6-3F9A-43ED-BCC2-4547CC5017BD}" type="datetimeFigureOut">
               <a:rPr lang="en-SG" smtClean="0"/>
-              <a:t>18/6/2015</a:t>
+              <a:t>19/6/2015</a:t>
             </a:fld>
             <a:endParaRPr lang="en-SG"/>
           </a:p>
@@ -712,7 +712,7 @@
           <a:p>
             <a:fld id="{699DC775-C286-4358-8C92-D7E584E969B3}" type="datetimeFigureOut">
               <a:rPr lang="en-US" smtClean="0"/>
-              <a:t>18-Jun-15</a:t>
+              <a:t>19-Jun-15</a:t>
             </a:fld>
             <a:endParaRPr lang="en-US"/>
           </a:p>
@@ -882,7 +882,7 @@
           <a:p>
             <a:fld id="{699DC775-C286-4358-8C92-D7E584E969B3}" type="datetimeFigureOut">
               <a:rPr lang="en-US" smtClean="0"/>
-              <a:t>18-Jun-15</a:t>
+              <a:t>19-Jun-15</a:t>
             </a:fld>
             <a:endParaRPr lang="en-US"/>
           </a:p>
@@ -1062,7 +1062,7 @@
           <a:p>
             <a:fld id="{699DC775-C286-4358-8C92-D7E584E969B3}" type="datetimeFigureOut">
               <a:rPr lang="en-US" smtClean="0"/>
-              <a:t>18-Jun-15</a:t>
+              <a:t>19-Jun-15</a:t>
             </a:fld>
             <a:endParaRPr lang="en-US"/>
           </a:p>
@@ -1304,7 +1304,7 @@
           <a:p>
             <a:fld id="{699DC775-C286-4358-8C92-D7E584E969B3}" type="datetimeFigureOut">
               <a:rPr lang="en-US" smtClean="0"/>
-              <a:t>18-Jun-15</a:t>
+              <a:t>19-Jun-15</a:t>
             </a:fld>
             <a:endParaRPr lang="en-US"/>
           </a:p>
@@ -1474,7 +1474,7 @@
           <a:p>
             <a:fld id="{699DC775-C286-4358-8C92-D7E584E969B3}" type="datetimeFigureOut">
               <a:rPr lang="en-US" smtClean="0"/>
-              <a:t>18-Jun-15</a:t>
+              <a:t>19-Jun-15</a:t>
             </a:fld>
             <a:endParaRPr lang="en-US"/>
           </a:p>
@@ -1720,7 +1720,7 @@
           <a:p>
             <a:fld id="{699DC775-C286-4358-8C92-D7E584E969B3}" type="datetimeFigureOut">
               <a:rPr lang="en-US" smtClean="0"/>
-              <a:t>18-Jun-15</a:t>
+              <a:t>19-Jun-15</a:t>
             </a:fld>
             <a:endParaRPr lang="en-US"/>
           </a:p>
@@ -2008,7 +2008,7 @@
           <a:p>
             <a:fld id="{699DC775-C286-4358-8C92-D7E584E969B3}" type="datetimeFigureOut">
               <a:rPr lang="en-US" smtClean="0"/>
-              <a:t>18-Jun-15</a:t>
+              <a:t>19-Jun-15</a:t>
             </a:fld>
             <a:endParaRPr lang="en-US"/>
           </a:p>
@@ -2430,7 +2430,7 @@
           <a:p>
             <a:fld id="{699DC775-C286-4358-8C92-D7E584E969B3}" type="datetimeFigureOut">
               <a:rPr lang="en-US" smtClean="0"/>
-              <a:t>18-Jun-15</a:t>
+              <a:t>19-Jun-15</a:t>
             </a:fld>
             <a:endParaRPr lang="en-US"/>
           </a:p>
@@ -2548,7 +2548,7 @@
           <a:p>
             <a:fld id="{699DC775-C286-4358-8C92-D7E584E969B3}" type="datetimeFigureOut">
               <a:rPr lang="en-US" smtClean="0"/>
-              <a:t>18-Jun-15</a:t>
+              <a:t>19-Jun-15</a:t>
             </a:fld>
             <a:endParaRPr lang="en-US"/>
           </a:p>
@@ -2643,7 +2643,7 @@
           <a:p>
             <a:fld id="{699DC775-C286-4358-8C92-D7E584E969B3}" type="datetimeFigureOut">
               <a:rPr lang="en-US" smtClean="0"/>
-              <a:t>18-Jun-15</a:t>
+              <a:t>19-Jun-15</a:t>
             </a:fld>
             <a:endParaRPr lang="en-US"/>
           </a:p>
@@ -2920,7 +2920,7 @@
           <a:p>
             <a:fld id="{699DC775-C286-4358-8C92-D7E584E969B3}" type="datetimeFigureOut">
               <a:rPr lang="en-US" smtClean="0"/>
-              <a:t>18-Jun-15</a:t>
+              <a:t>19-Jun-15</a:t>
             </a:fld>
             <a:endParaRPr lang="en-US"/>
           </a:p>
@@ -3090,7 +3090,7 @@
           <a:p>
             <a:fld id="{699DC775-C286-4358-8C92-D7E584E969B3}" type="datetimeFigureOut">
               <a:rPr lang="en-US" smtClean="0"/>
-              <a:t>18-Jun-15</a:t>
+              <a:t>19-Jun-15</a:t>
             </a:fld>
             <a:endParaRPr lang="en-US"/>
           </a:p>
@@ -3343,7 +3343,7 @@
           <a:p>
             <a:fld id="{699DC775-C286-4358-8C92-D7E584E969B3}" type="datetimeFigureOut">
               <a:rPr lang="en-US" smtClean="0"/>
-              <a:t>18-Jun-15</a:t>
+              <a:t>19-Jun-15</a:t>
             </a:fld>
             <a:endParaRPr lang="en-US"/>
           </a:p>
@@ -3513,7 +3513,7 @@
           <a:p>
             <a:fld id="{699DC775-C286-4358-8C92-D7E584E969B3}" type="datetimeFigureOut">
               <a:rPr lang="en-US" smtClean="0"/>
-              <a:t>18-Jun-15</a:t>
+              <a:t>19-Jun-15</a:t>
             </a:fld>
             <a:endParaRPr lang="en-US"/>
           </a:p>
@@ -3693,7 +3693,7 @@
           <a:p>
             <a:fld id="{699DC775-C286-4358-8C92-D7E584E969B3}" type="datetimeFigureOut">
               <a:rPr lang="en-US" smtClean="0"/>
-              <a:t>18-Jun-15</a:t>
+              <a:t>19-Jun-15</a:t>
             </a:fld>
             <a:endParaRPr lang="en-US"/>
           </a:p>
@@ -3943,7 +3943,7 @@
           <a:p>
             <a:fld id="{699DC775-C286-4358-8C92-D7E584E969B3}" type="datetimeFigureOut">
               <a:rPr lang="en-US" smtClean="0"/>
-              <a:t>18-Jun-15</a:t>
+              <a:t>19-Jun-15</a:t>
             </a:fld>
             <a:endParaRPr lang="en-US"/>
           </a:p>
@@ -4121,7 +4121,7 @@
           <a:p>
             <a:fld id="{699DC775-C286-4358-8C92-D7E584E969B3}" type="datetimeFigureOut">
               <a:rPr lang="en-US" smtClean="0"/>
-              <a:t>18-Jun-15</a:t>
+              <a:t>19-Jun-15</a:t>
             </a:fld>
             <a:endParaRPr lang="en-US"/>
           </a:p>
@@ -4375,7 +4375,7 @@
           <a:p>
             <a:fld id="{699DC775-C286-4358-8C92-D7E584E969B3}" type="datetimeFigureOut">
               <a:rPr lang="en-US" smtClean="0"/>
-              <a:t>18-Jun-15</a:t>
+              <a:t>19-Jun-15</a:t>
             </a:fld>
             <a:endParaRPr lang="en-US"/>
           </a:p>
@@ -4671,7 +4671,7 @@
           <a:p>
             <a:fld id="{699DC775-C286-4358-8C92-D7E584E969B3}" type="datetimeFigureOut">
               <a:rPr lang="en-US" smtClean="0"/>
-              <a:t>18-Jun-15</a:t>
+              <a:t>19-Jun-15</a:t>
             </a:fld>
             <a:endParaRPr lang="en-US"/>
           </a:p>
@@ -5101,7 +5101,7 @@
           <a:p>
             <a:fld id="{699DC775-C286-4358-8C92-D7E584E969B3}" type="datetimeFigureOut">
               <a:rPr lang="en-US" smtClean="0"/>
-              <a:t>18-Jun-15</a:t>
+              <a:t>19-Jun-15</a:t>
             </a:fld>
             <a:endParaRPr lang="en-US"/>
           </a:p>
@@ -5227,7 +5227,7 @@
           <a:p>
             <a:fld id="{699DC775-C286-4358-8C92-D7E584E969B3}" type="datetimeFigureOut">
               <a:rPr lang="en-US" smtClean="0"/>
-              <a:t>18-Jun-15</a:t>
+              <a:t>19-Jun-15</a:t>
             </a:fld>
             <a:endParaRPr lang="en-US"/>
           </a:p>
@@ -5330,7 +5330,7 @@
           <a:p>
             <a:fld id="{699DC775-C286-4358-8C92-D7E584E969B3}" type="datetimeFigureOut">
               <a:rPr lang="en-US" smtClean="0"/>
-              <a:t>18-Jun-15</a:t>
+              <a:t>19-Jun-15</a:t>
             </a:fld>
             <a:endParaRPr lang="en-US"/>
           </a:p>
@@ -5576,7 +5576,7 @@
           <a:p>
             <a:fld id="{699DC775-C286-4358-8C92-D7E584E969B3}" type="datetimeFigureOut">
               <a:rPr lang="en-US" smtClean="0"/>
-              <a:t>18-Jun-15</a:t>
+              <a:t>19-Jun-15</a:t>
             </a:fld>
             <a:endParaRPr lang="en-US"/>
           </a:p>
@@ -5861,7 +5861,7 @@
           <a:p>
             <a:fld id="{699DC775-C286-4358-8C92-D7E584E969B3}" type="datetimeFigureOut">
               <a:rPr lang="en-US" smtClean="0"/>
-              <a:t>18-Jun-15</a:t>
+              <a:t>19-Jun-15</a:t>
             </a:fld>
             <a:endParaRPr lang="en-US"/>
           </a:p>
@@ -6122,7 +6122,7 @@
           <a:p>
             <a:fld id="{699DC775-C286-4358-8C92-D7E584E969B3}" type="datetimeFigureOut">
               <a:rPr lang="en-US" smtClean="0"/>
-              <a:t>18-Jun-15</a:t>
+              <a:t>19-Jun-15</a:t>
             </a:fld>
             <a:endParaRPr lang="en-US"/>
           </a:p>
@@ -6300,7 +6300,7 @@
           <a:p>
             <a:fld id="{699DC775-C286-4358-8C92-D7E584E969B3}" type="datetimeFigureOut">
               <a:rPr lang="en-US" smtClean="0"/>
-              <a:t>18-Jun-15</a:t>
+              <a:t>19-Jun-15</a:t>
             </a:fld>
             <a:endParaRPr lang="en-US"/>
           </a:p>
@@ -6488,7 +6488,7 @@
           <a:p>
             <a:fld id="{699DC775-C286-4358-8C92-D7E584E969B3}" type="datetimeFigureOut">
               <a:rPr lang="en-US" smtClean="0"/>
-              <a:t>18-Jun-15</a:t>
+              <a:t>19-Jun-15</a:t>
             </a:fld>
             <a:endParaRPr lang="en-US"/>
           </a:p>
@@ -6776,7 +6776,7 @@
           <a:p>
             <a:fld id="{699DC775-C286-4358-8C92-D7E584E969B3}" type="datetimeFigureOut">
               <a:rPr lang="en-US" smtClean="0"/>
-              <a:t>18-Jun-15</a:t>
+              <a:t>19-Jun-15</a:t>
             </a:fld>
             <a:endParaRPr lang="en-US"/>
           </a:p>
@@ -7198,7 +7198,7 @@
           <a:p>
             <a:fld id="{699DC775-C286-4358-8C92-D7E584E969B3}" type="datetimeFigureOut">
               <a:rPr lang="en-US" smtClean="0"/>
-              <a:t>18-Jun-15</a:t>
+              <a:t>19-Jun-15</a:t>
             </a:fld>
             <a:endParaRPr lang="en-US"/>
           </a:p>
@@ -7316,7 +7316,7 @@
           <a:p>
             <a:fld id="{699DC775-C286-4358-8C92-D7E584E969B3}" type="datetimeFigureOut">
               <a:rPr lang="en-US" smtClean="0"/>
-              <a:t>18-Jun-15</a:t>
+              <a:t>19-Jun-15</a:t>
             </a:fld>
             <a:endParaRPr lang="en-US"/>
           </a:p>
@@ -7411,7 +7411,7 @@
           <a:p>
             <a:fld id="{699DC775-C286-4358-8C92-D7E584E969B3}" type="datetimeFigureOut">
               <a:rPr lang="en-US" smtClean="0"/>
-              <a:t>18-Jun-15</a:t>
+              <a:t>19-Jun-15</a:t>
             </a:fld>
             <a:endParaRPr lang="en-US"/>
           </a:p>
@@ -7688,7 +7688,7 @@
           <a:p>
             <a:fld id="{699DC775-C286-4358-8C92-D7E584E969B3}" type="datetimeFigureOut">
               <a:rPr lang="en-US" smtClean="0"/>
-              <a:t>18-Jun-15</a:t>
+              <a:t>19-Jun-15</a:t>
             </a:fld>
             <a:endParaRPr lang="en-US"/>
           </a:p>
@@ -7941,7 +7941,7 @@
           <a:p>
             <a:fld id="{699DC775-C286-4358-8C92-D7E584E969B3}" type="datetimeFigureOut">
               <a:rPr lang="en-US" smtClean="0"/>
-              <a:t>18-Jun-15</a:t>
+              <a:t>19-Jun-15</a:t>
             </a:fld>
             <a:endParaRPr lang="en-US"/>
           </a:p>
@@ -8154,7 +8154,7 @@
           <a:p>
             <a:fld id="{699DC775-C286-4358-8C92-D7E584E969B3}" type="datetimeFigureOut">
               <a:rPr lang="en-US" smtClean="0"/>
-              <a:t>18-Jun-15</a:t>
+              <a:t>19-Jun-15</a:t>
             </a:fld>
             <a:endParaRPr lang="en-US"/>
           </a:p>
@@ -8669,7 +8669,7 @@
           <a:p>
             <a:fld id="{699DC775-C286-4358-8C92-D7E584E969B3}" type="datetimeFigureOut">
               <a:rPr lang="en-US" smtClean="0"/>
-              <a:t>18-Jun-15</a:t>
+              <a:t>19-Jun-15</a:t>
             </a:fld>
             <a:endParaRPr lang="en-US"/>
           </a:p>
@@ -9182,7 +9182,7 @@
           <a:p>
             <a:fld id="{699DC775-C286-4358-8C92-D7E584E969B3}" type="datetimeFigureOut">
               <a:rPr lang="en-US" smtClean="0"/>
-              <a:t>18-Jun-15</a:t>
+              <a:t>19-Jun-15</a:t>
             </a:fld>
             <a:endParaRPr lang="en-US"/>
           </a:p>
@@ -9763,6 +9763,49 @@
       </p:grpSpPr>
       <p:sp>
         <p:nvSpPr>
+          <p:cNvPr id="3" name="Rectangle 4"/>
+          <p:cNvSpPr/>
+          <p:nvPr/>
+        </p:nvSpPr>
+        <p:spPr>
+          <a:xfrm>
+            <a:off x="0" y="2286000"/>
+            <a:ext cx="9144000" cy="2209800"/>
+          </a:xfrm>
+          <a:prstGeom prst="rect">
+            <a:avLst/>
+          </a:prstGeom>
+          <a:solidFill>
+            <a:srgbClr val="002060"/>
+          </a:solidFill>
+        </p:spPr>
+        <p:style>
+          <a:lnRef idx="2">
+            <a:schemeClr val="accent1">
+              <a:shade val="50000"/>
+            </a:schemeClr>
+          </a:lnRef>
+          <a:fillRef idx="1">
+            <a:schemeClr val="accent1"/>
+          </a:fillRef>
+          <a:effectRef idx="0">
+            <a:schemeClr val="accent1"/>
+          </a:effectRef>
+          <a:fontRef idx="minor">
+            <a:schemeClr val="lt1"/>
+          </a:fontRef>
+        </p:style>
+        <p:txBody>
+          <a:bodyPr rtlCol="0" anchor="ctr"/>
+          <a:lstStyle/>
+          <a:p>
+            <a:pPr algn="ctr"/>
+            <a:endParaRPr lang="en-US"/>
+          </a:p>
+        </p:txBody>
+      </p:sp>
+      <p:sp>
+        <p:nvSpPr>
           <p:cNvPr id="2" name="First Textbox"/>
           <p:cNvSpPr txBox="1"/>
           <p:nvPr/>
@@ -10076,6 +10119,49 @@
           <a:chExt cx="0" cy="0"/>
         </a:xfrm>
       </p:grpSpPr>
+      <p:sp>
+        <p:nvSpPr>
+          <p:cNvPr id="3" name="Rectangle 4"/>
+          <p:cNvSpPr/>
+          <p:nvPr/>
+        </p:nvSpPr>
+        <p:spPr>
+          <a:xfrm>
+            <a:off x="0" y="2286000"/>
+            <a:ext cx="9144000" cy="2209800"/>
+          </a:xfrm>
+          <a:prstGeom prst="rect">
+            <a:avLst/>
+          </a:prstGeom>
+          <a:solidFill>
+            <a:srgbClr val="002060"/>
+          </a:solidFill>
+        </p:spPr>
+        <p:style>
+          <a:lnRef idx="2">
+            <a:schemeClr val="accent1">
+              <a:shade val="50000"/>
+            </a:schemeClr>
+          </a:lnRef>
+          <a:fillRef idx="1">
+            <a:schemeClr val="accent1"/>
+          </a:fillRef>
+          <a:effectRef idx="0">
+            <a:schemeClr val="accent1"/>
+          </a:effectRef>
+          <a:fontRef idx="minor">
+            <a:schemeClr val="lt1"/>
+          </a:fontRef>
+        </p:style>
+        <p:txBody>
+          <a:bodyPr rtlCol="0" anchor="ctr"/>
+          <a:lstStyle/>
+          <a:p>
+            <a:pPr algn="ctr"/>
+            <a:endParaRPr lang="en-US"/>
+          </a:p>
+        </p:txBody>
+      </p:sp>
       <p:sp>
         <p:nvSpPr>
           <p:cNvPr id="2" name="HighlightTextShape201506181201489892"/>
@@ -11106,6 +11192,49 @@
       </p:grpSpPr>
       <p:sp>
         <p:nvSpPr>
+          <p:cNvPr id="5" name="Rectangle 4"/>
+          <p:cNvSpPr/>
+          <p:nvPr/>
+        </p:nvSpPr>
+        <p:spPr>
+          <a:xfrm>
+            <a:off x="0" y="2286000"/>
+            <a:ext cx="9144000" cy="2209800"/>
+          </a:xfrm>
+          <a:prstGeom prst="rect">
+            <a:avLst/>
+          </a:prstGeom>
+          <a:solidFill>
+            <a:srgbClr val="002060"/>
+          </a:solidFill>
+        </p:spPr>
+        <p:style>
+          <a:lnRef idx="2">
+            <a:schemeClr val="accent1">
+              <a:shade val="50000"/>
+            </a:schemeClr>
+          </a:lnRef>
+          <a:fillRef idx="1">
+            <a:schemeClr val="accent1"/>
+          </a:fillRef>
+          <a:effectRef idx="0">
+            <a:schemeClr val="accent1"/>
+          </a:effectRef>
+          <a:fontRef idx="minor">
+            <a:schemeClr val="lt1"/>
+          </a:fontRef>
+        </p:style>
+        <p:txBody>
+          <a:bodyPr rtlCol="0" anchor="ctr"/>
+          <a:lstStyle/>
+          <a:p>
+            <a:pPr algn="ctr"/>
+            <a:endParaRPr lang="en-US"/>
+          </a:p>
+        </p:txBody>
+      </p:sp>
+      <p:sp>
+        <p:nvSpPr>
           <p:cNvPr id="2" name="First Textbox"/>
           <p:cNvSpPr txBox="1"/>
           <p:nvPr/>
@@ -11472,6 +11601,49 @@
           <a:chExt cx="0" cy="0"/>
         </a:xfrm>
       </p:grpSpPr>
+      <p:sp>
+        <p:nvSpPr>
+          <p:cNvPr id="12" name="Rectangle 4"/>
+          <p:cNvSpPr/>
+          <p:nvPr/>
+        </p:nvSpPr>
+        <p:spPr>
+          <a:xfrm>
+            <a:off x="0" y="2286000"/>
+            <a:ext cx="9144000" cy="2209800"/>
+          </a:xfrm>
+          <a:prstGeom prst="rect">
+            <a:avLst/>
+          </a:prstGeom>
+          <a:solidFill>
+            <a:srgbClr val="002060"/>
+          </a:solidFill>
+        </p:spPr>
+        <p:style>
+          <a:lnRef idx="2">
+            <a:schemeClr val="accent1">
+              <a:shade val="50000"/>
+            </a:schemeClr>
+          </a:lnRef>
+          <a:fillRef idx="1">
+            <a:schemeClr val="accent1"/>
+          </a:fillRef>
+          <a:effectRef idx="0">
+            <a:schemeClr val="accent1"/>
+          </a:effectRef>
+          <a:fontRef idx="minor">
+            <a:schemeClr val="lt1"/>
+          </a:fontRef>
+        </p:style>
+        <p:txBody>
+          <a:bodyPr rtlCol="0" anchor="ctr"/>
+          <a:lstStyle/>
+          <a:p>
+            <a:pPr algn="ctr"/>
+            <a:endParaRPr lang="en-US"/>
+          </a:p>
+        </p:txBody>
+      </p:sp>
       <p:sp>
         <p:nvSpPr>
           <p:cNvPr id="5" name="PPTLabsHighlightBackgroundShape201506181734557349"/>
@@ -11754,87 +11926,6 @@
       </p:sp>
       <p:sp>
         <p:nvSpPr>
-          <p:cNvPr id="2" name="HighlightBackgroundShape961d3f1e-187d-4b94-8f93-1be85193a105"/>
-          <p:cNvSpPr txBox="1"/>
-          <p:nvPr/>
-        </p:nvSpPr>
-        <p:spPr>
-          <a:xfrm>
-            <a:off x="304800" y="381000"/>
-            <a:ext cx="7620000" cy="2400657"/>
-          </a:xfrm>
-          <a:prstGeom prst="rect">
-            <a:avLst/>
-          </a:prstGeom>
-          <a:noFill/>
-        </p:spPr>
-        <p:txBody>
-          <a:bodyPr wrap="square" rtlCol="0">
-            <a:spAutoFit/>
-          </a:bodyPr>
-          <a:lstStyle/>
-          <a:p>
-            <a:pPr marL="285750" indent="-285750">
-              <a:buFont typeface="Arial" panose="020B0604020202020204" pitchFamily="34" charset="0"/>
-              <a:buChar char="•"/>
-            </a:pPr>
-            <a:r>
-              <a:rPr lang="en-US" sz="2800" dirty="0" smtClean="0"/>
-              <a:t>Test - Non-ABC: 1234567890!@#$%^&amp;*()</a:t>
-            </a:r>
-          </a:p>
-          <a:p>
-            <a:r>
-              <a:rPr lang="en-US" sz="2800" dirty="0"/>
-              <a:t>Test </a:t>
-            </a:r>
-            <a:r>
-              <a:rPr lang="en-US" sz="2800" dirty="0" smtClean="0"/>
-              <a:t>– No bullet point</a:t>
-            </a:r>
-            <a:endParaRPr lang="en-US" sz="2800" dirty="0"/>
-          </a:p>
-          <a:p>
-            <a:pPr marL="514350" indent="-514350">
-              <a:buFont typeface="+mj-lt"/>
-              <a:buAutoNum type="arabicPeriod"/>
-            </a:pPr>
-            <a:r>
-              <a:rPr lang="en-US" sz="2800" dirty="0"/>
-              <a:t>Test – </a:t>
-            </a:r>
-            <a:r>
-              <a:rPr lang="en-US" sz="2800" dirty="0" smtClean="0"/>
-              <a:t>Different bullet point</a:t>
-            </a:r>
-          </a:p>
-          <a:p>
-            <a:pPr marL="285750" indent="-285750">
-              <a:buFont typeface="Arial" panose="020B0604020202020204" pitchFamily="34" charset="0"/>
-              <a:buChar char="•"/>
-            </a:pPr>
-            <a:r>
-              <a:rPr lang="en-US" sz="2800" dirty="0" smtClean="0">
-                <a:latin typeface="Times New Roman" panose="02020603050405020304" pitchFamily="18" charset="0"/>
-                <a:cs typeface="Times New Roman" panose="02020603050405020304" pitchFamily="18" charset="0"/>
-              </a:rPr>
-              <a:t>Test - Another Font Family, using Times New Roman</a:t>
-            </a:r>
-          </a:p>
-          <a:p>
-            <a:pPr marL="285750" indent="-285750">
-              <a:buFont typeface="Arial" panose="020B0604020202020204" pitchFamily="34" charset="0"/>
-              <a:buChar char="•"/>
-            </a:pPr>
-            <a:r>
-              <a:rPr lang="en-US" sz="1000" dirty="0" smtClean="0"/>
-              <a:t>Test - very small content. Test: very small content. Test: very small content. Test: very small content</a:t>
-            </a:r>
-          </a:p>
-        </p:txBody>
-      </p:sp>
-      <p:sp>
-        <p:nvSpPr>
           <p:cNvPr id="9" name="PPTLabsHighlightBackgroundShape201506181734557529"/>
           <p:cNvSpPr>
             <a:spLocks/>
@@ -12038,6 +12129,87 @@
           <a:p>
             <a:pPr algn="ctr"/>
             <a:endParaRPr lang="en-US"/>
+          </a:p>
+        </p:txBody>
+      </p:sp>
+      <p:sp>
+        <p:nvSpPr>
+          <p:cNvPr id="2" name="HighlightBackgroundShape961d3f1e-187d-4b94-8f93-1be85193a105"/>
+          <p:cNvSpPr txBox="1"/>
+          <p:nvPr/>
+        </p:nvSpPr>
+        <p:spPr>
+          <a:xfrm>
+            <a:off x="304800" y="381000"/>
+            <a:ext cx="7620000" cy="2400657"/>
+          </a:xfrm>
+          <a:prstGeom prst="rect">
+            <a:avLst/>
+          </a:prstGeom>
+          <a:noFill/>
+        </p:spPr>
+        <p:txBody>
+          <a:bodyPr wrap="square" rtlCol="0">
+            <a:spAutoFit/>
+          </a:bodyPr>
+          <a:lstStyle/>
+          <a:p>
+            <a:pPr marL="285750" indent="-285750">
+              <a:buFont typeface="Arial" panose="020B0604020202020204" pitchFamily="34" charset="0"/>
+              <a:buChar char="•"/>
+            </a:pPr>
+            <a:r>
+              <a:rPr lang="en-US" sz="2800" dirty="0" smtClean="0"/>
+              <a:t>Test - Non-ABC: 1234567890!@#$%^&amp;*()</a:t>
+            </a:r>
+          </a:p>
+          <a:p>
+            <a:r>
+              <a:rPr lang="en-US" sz="2800" dirty="0"/>
+              <a:t>Test </a:t>
+            </a:r>
+            <a:r>
+              <a:rPr lang="en-US" sz="2800" dirty="0" smtClean="0"/>
+              <a:t>– No bullet point</a:t>
+            </a:r>
+            <a:endParaRPr lang="en-US" sz="2800" dirty="0"/>
+          </a:p>
+          <a:p>
+            <a:pPr marL="514350" indent="-514350">
+              <a:buFont typeface="+mj-lt"/>
+              <a:buAutoNum type="arabicPeriod"/>
+            </a:pPr>
+            <a:r>
+              <a:rPr lang="en-US" sz="2800" dirty="0"/>
+              <a:t>Test – </a:t>
+            </a:r>
+            <a:r>
+              <a:rPr lang="en-US" sz="2800" dirty="0" smtClean="0"/>
+              <a:t>Different bullet point</a:t>
+            </a:r>
+          </a:p>
+          <a:p>
+            <a:pPr marL="285750" indent="-285750">
+              <a:buFont typeface="Arial" panose="020B0604020202020204" pitchFamily="34" charset="0"/>
+              <a:buChar char="•"/>
+            </a:pPr>
+            <a:r>
+              <a:rPr lang="en-US" sz="2800" dirty="0" smtClean="0">
+                <a:latin typeface="Times New Roman" panose="02020603050405020304" pitchFamily="18" charset="0"/>
+                <a:cs typeface="Times New Roman" panose="02020603050405020304" pitchFamily="18" charset="0"/>
+              </a:rPr>
+              <a:t>Test - Another Font Family, using Times New Roman</a:t>
+            </a:r>
+          </a:p>
+          <a:p>
+            <a:pPr marL="285750" indent="-285750">
+              <a:buFont typeface="Arial" panose="020B0604020202020204" pitchFamily="34" charset="0"/>
+              <a:buChar char="•"/>
+            </a:pPr>
+            <a:r>
+              <a:rPr lang="en-US" sz="1000" dirty="0" smtClean="0"/>
+              <a:t>Test - very small content. Test: very small content. Test: very small content. Test: very small content</a:t>
+            </a:r>
           </a:p>
         </p:txBody>
       </p:sp>
@@ -13245,6 +13417,49 @@
       </p:grpSpPr>
       <p:sp>
         <p:nvSpPr>
+          <p:cNvPr id="5" name="Rectangle 4"/>
+          <p:cNvSpPr/>
+          <p:nvPr/>
+        </p:nvSpPr>
+        <p:spPr>
+          <a:xfrm>
+            <a:off x="0" y="2286000"/>
+            <a:ext cx="9144000" cy="2209800"/>
+          </a:xfrm>
+          <a:prstGeom prst="rect">
+            <a:avLst/>
+          </a:prstGeom>
+          <a:solidFill>
+            <a:srgbClr val="002060"/>
+          </a:solidFill>
+        </p:spPr>
+        <p:style>
+          <a:lnRef idx="2">
+            <a:schemeClr val="accent1">
+              <a:shade val="50000"/>
+            </a:schemeClr>
+          </a:lnRef>
+          <a:fillRef idx="1">
+            <a:schemeClr val="accent1"/>
+          </a:fillRef>
+          <a:effectRef idx="0">
+            <a:schemeClr val="accent1"/>
+          </a:effectRef>
+          <a:fontRef idx="minor">
+            <a:schemeClr val="lt1"/>
+          </a:fontRef>
+        </p:style>
+        <p:txBody>
+          <a:bodyPr rtlCol="0" anchor="ctr"/>
+          <a:lstStyle/>
+          <a:p>
+            <a:pPr algn="ctr"/>
+            <a:endParaRPr lang="en-US"/>
+          </a:p>
+        </p:txBody>
+      </p:sp>
+      <p:sp>
+        <p:nvSpPr>
           <p:cNvPr id="2" name="First Textbox"/>
           <p:cNvSpPr txBox="1"/>
           <p:nvPr/>
@@ -13611,6 +13826,49 @@
           <a:chExt cx="0" cy="0"/>
         </a:xfrm>
       </p:grpSpPr>
+      <p:sp>
+        <p:nvSpPr>
+          <p:cNvPr id="13" name="Rectangle 4"/>
+          <p:cNvSpPr/>
+          <p:nvPr/>
+        </p:nvSpPr>
+        <p:spPr>
+          <a:xfrm>
+            <a:off x="0" y="2286000"/>
+            <a:ext cx="9144000" cy="2209800"/>
+          </a:xfrm>
+          <a:prstGeom prst="rect">
+            <a:avLst/>
+          </a:prstGeom>
+          <a:solidFill>
+            <a:srgbClr val="002060"/>
+          </a:solidFill>
+        </p:spPr>
+        <p:style>
+          <a:lnRef idx="2">
+            <a:schemeClr val="accent1">
+              <a:shade val="50000"/>
+            </a:schemeClr>
+          </a:lnRef>
+          <a:fillRef idx="1">
+            <a:schemeClr val="accent1"/>
+          </a:fillRef>
+          <a:effectRef idx="0">
+            <a:schemeClr val="accent1"/>
+          </a:effectRef>
+          <a:fontRef idx="minor">
+            <a:schemeClr val="lt1"/>
+          </a:fontRef>
+        </p:style>
+        <p:txBody>
+          <a:bodyPr rtlCol="0" anchor="ctr"/>
+          <a:lstStyle/>
+          <a:p>
+            <a:pPr algn="ctr"/>
+            <a:endParaRPr lang="en-US"/>
+          </a:p>
+        </p:txBody>
+      </p:sp>
       <p:sp>
         <p:nvSpPr>
           <p:cNvPr id="5" name="PPTLabsHighlightBackgroundShape201506181734443923"/>
@@ -13893,87 +14151,6 @@
       </p:sp>
       <p:sp>
         <p:nvSpPr>
-          <p:cNvPr id="2" name="HighlightBackgroundShapeea60d9b9-ed30-4da3-a1da-6902e7f48621"/>
-          <p:cNvSpPr txBox="1"/>
-          <p:nvPr/>
-        </p:nvSpPr>
-        <p:spPr>
-          <a:xfrm>
-            <a:off x="304800" y="381000"/>
-            <a:ext cx="7620000" cy="2400657"/>
-          </a:xfrm>
-          <a:prstGeom prst="rect">
-            <a:avLst/>
-          </a:prstGeom>
-          <a:noFill/>
-        </p:spPr>
-        <p:txBody>
-          <a:bodyPr wrap="square" rtlCol="0">
-            <a:spAutoFit/>
-          </a:bodyPr>
-          <a:lstStyle/>
-          <a:p>
-            <a:pPr marL="285750" indent="-285750">
-              <a:buFont typeface="Arial" panose="020B0604020202020204" pitchFamily="34" charset="0"/>
-              <a:buChar char="•"/>
-            </a:pPr>
-            <a:r>
-              <a:rPr lang="en-US" sz="2800" dirty="0" smtClean="0"/>
-              <a:t>Test - Non-ABC: 1234567890!@#$%^&amp;*()</a:t>
-            </a:r>
-          </a:p>
-          <a:p>
-            <a:r>
-              <a:rPr lang="en-US" sz="2800" dirty="0"/>
-              <a:t>Test </a:t>
-            </a:r>
-            <a:r>
-              <a:rPr lang="en-US" sz="2800" dirty="0" smtClean="0"/>
-              <a:t>– No bullet point</a:t>
-            </a:r>
-            <a:endParaRPr lang="en-US" sz="2800" dirty="0"/>
-          </a:p>
-          <a:p>
-            <a:pPr marL="514350" indent="-514350">
-              <a:buFont typeface="+mj-lt"/>
-              <a:buAutoNum type="arabicPeriod"/>
-            </a:pPr>
-            <a:r>
-              <a:rPr lang="en-US" sz="2800" dirty="0"/>
-              <a:t>Test – </a:t>
-            </a:r>
-            <a:r>
-              <a:rPr lang="en-US" sz="2800" dirty="0" smtClean="0"/>
-              <a:t>Different bullet point</a:t>
-            </a:r>
-          </a:p>
-          <a:p>
-            <a:pPr marL="285750" indent="-285750">
-              <a:buFont typeface="Arial" panose="020B0604020202020204" pitchFamily="34" charset="0"/>
-              <a:buChar char="•"/>
-            </a:pPr>
-            <a:r>
-              <a:rPr lang="en-US" sz="2800" dirty="0" smtClean="0">
-                <a:latin typeface="Times New Roman" panose="02020603050405020304" pitchFamily="18" charset="0"/>
-                <a:cs typeface="Times New Roman" panose="02020603050405020304" pitchFamily="18" charset="0"/>
-              </a:rPr>
-              <a:t>Test - Another Font Family, using Times New Roman</a:t>
-            </a:r>
-          </a:p>
-          <a:p>
-            <a:pPr marL="285750" indent="-285750">
-              <a:buFont typeface="Arial" panose="020B0604020202020204" pitchFamily="34" charset="0"/>
-              <a:buChar char="•"/>
-            </a:pPr>
-            <a:r>
-              <a:rPr lang="en-US" sz="1000" dirty="0" smtClean="0"/>
-              <a:t>Test - very small content. Test: very small content. Test: very small content. Test: very small content</a:t>
-            </a:r>
-          </a:p>
-        </p:txBody>
-      </p:sp>
-      <p:sp>
-        <p:nvSpPr>
           <p:cNvPr id="10" name="PPTLabsHighlightBackgroundShape201506181734444113"/>
           <p:cNvSpPr>
             <a:spLocks/>
@@ -14182,223 +14359,6 @@
       </p:sp>
       <p:sp>
         <p:nvSpPr>
-          <p:cNvPr id="3" name="HighlightBackgroundShapec485a6a5-1d97-42dc-ab66-ce7355d7009d"/>
-          <p:cNvSpPr txBox="1"/>
-          <p:nvPr/>
-        </p:nvSpPr>
-        <p:spPr>
-          <a:xfrm>
-            <a:off x="1524000" y="3048000"/>
-            <a:ext cx="7620000" cy="3600986"/>
-          </a:xfrm>
-          <a:prstGeom prst="rect">
-            <a:avLst/>
-          </a:prstGeom>
-          <a:noFill/>
-        </p:spPr>
-        <p:txBody>
-          <a:bodyPr wrap="square" rtlCol="0">
-            <a:spAutoFit/>
-          </a:bodyPr>
-          <a:lstStyle/>
-          <a:p>
-            <a:pPr marL="285750" indent="-285750">
-              <a:buFont typeface="Arial" panose="020B0604020202020204" pitchFamily="34" charset="0"/>
-              <a:buChar char="•"/>
-            </a:pPr>
-            <a:r>
-              <a:rPr lang="en-US" sz="6600" dirty="0" smtClean="0">
-                <a:latin typeface="Arial Black" panose="020B0A04020102020204" pitchFamily="34" charset="0"/>
-              </a:rPr>
-              <a:t>Test - very big</a:t>
-            </a:r>
-          </a:p>
-          <a:p>
-            <a:pPr marL="285750" indent="-285750">
-              <a:buFont typeface="Arial" panose="020B0604020202020204" pitchFamily="34" charset="0"/>
-              <a:buChar char="•"/>
-            </a:pPr>
-            <a:r>
-              <a:rPr lang="en-US" sz="3600" dirty="0" smtClean="0"/>
-              <a:t>Test – Long sentence: </a:t>
-            </a:r>
-            <a:r>
-              <a:rPr lang="en-US" sz="3600" dirty="0" err="1" smtClean="0"/>
-              <a:t>Asdddd</a:t>
-            </a:r>
-            <a:r>
-              <a:rPr lang="en-US" sz="3600" dirty="0" smtClean="0"/>
-              <a:t> </a:t>
-            </a:r>
-            <a:r>
-              <a:rPr lang="en-US" sz="3600" dirty="0" err="1" smtClean="0"/>
-              <a:t>ddd</a:t>
-            </a:r>
-            <a:r>
-              <a:rPr lang="en-US" sz="3600" dirty="0" smtClean="0"/>
-              <a:t> </a:t>
-            </a:r>
-            <a:r>
-              <a:rPr lang="en-US" sz="3600" dirty="0" err="1" smtClean="0"/>
-              <a:t>dd</a:t>
-            </a:r>
-            <a:r>
-              <a:rPr lang="en-US" sz="3600" dirty="0" smtClean="0"/>
-              <a:t> d </a:t>
-            </a:r>
-            <a:r>
-              <a:rPr lang="en-US" sz="3600" dirty="0" err="1" smtClean="0"/>
-              <a:t>ddddd</a:t>
-            </a:r>
-            <a:r>
-              <a:rPr lang="en-US" sz="3600" dirty="0" smtClean="0"/>
-              <a:t> </a:t>
-            </a:r>
-            <a:r>
-              <a:rPr lang="en-US" sz="3600" dirty="0" err="1" smtClean="0"/>
-              <a:t>ddd</a:t>
-            </a:r>
-            <a:r>
-              <a:rPr lang="en-US" sz="3600" dirty="0" smtClean="0"/>
-              <a:t> </a:t>
-            </a:r>
-            <a:r>
-              <a:rPr lang="en-US" sz="3600" dirty="0" err="1" smtClean="0"/>
-              <a:t>ddd</a:t>
-            </a:r>
-            <a:r>
-              <a:rPr lang="en-US" sz="3600" dirty="0" smtClean="0"/>
-              <a:t> </a:t>
-            </a:r>
-            <a:r>
-              <a:rPr lang="en-US" sz="3600" dirty="0" err="1" smtClean="0"/>
-              <a:t>ddd</a:t>
-            </a:r>
-            <a:r>
-              <a:rPr lang="en-US" sz="3600" dirty="0" smtClean="0"/>
-              <a:t> </a:t>
-            </a:r>
-            <a:r>
-              <a:rPr lang="en-US" sz="3600" dirty="0" err="1" smtClean="0"/>
-              <a:t>ddd</a:t>
-            </a:r>
-            <a:r>
-              <a:rPr lang="en-US" sz="3600" dirty="0" smtClean="0"/>
-              <a:t> </a:t>
-            </a:r>
-            <a:r>
-              <a:rPr lang="en-US" sz="3600" dirty="0" err="1" smtClean="0"/>
-              <a:t>ddd</a:t>
-            </a:r>
-            <a:r>
-              <a:rPr lang="en-US" sz="3600" dirty="0" smtClean="0"/>
-              <a:t> </a:t>
-            </a:r>
-            <a:r>
-              <a:rPr lang="en-US" sz="3600" dirty="0" err="1" smtClean="0"/>
-              <a:t>ddd</a:t>
-            </a:r>
-            <a:r>
-              <a:rPr lang="en-US" sz="3600" dirty="0" smtClean="0"/>
-              <a:t> </a:t>
-            </a:r>
-            <a:r>
-              <a:rPr lang="en-US" sz="3600" dirty="0" err="1" smtClean="0"/>
-              <a:t>ddd</a:t>
-            </a:r>
-            <a:r>
-              <a:rPr lang="en-US" sz="3600" dirty="0" smtClean="0"/>
-              <a:t> </a:t>
-            </a:r>
-            <a:r>
-              <a:rPr lang="en-US" sz="3600" dirty="0" err="1" smtClean="0"/>
-              <a:t>dddddd</a:t>
-            </a:r>
-            <a:r>
-              <a:rPr lang="en-US" sz="3600" dirty="0" smtClean="0"/>
-              <a:t> </a:t>
-            </a:r>
-            <a:r>
-              <a:rPr lang="en-US" sz="3600" dirty="0" err="1" smtClean="0"/>
-              <a:t>dd</a:t>
-            </a:r>
-            <a:r>
-              <a:rPr lang="en-US" sz="3600" dirty="0" smtClean="0"/>
-              <a:t> </a:t>
-            </a:r>
-            <a:r>
-              <a:rPr lang="en-US" sz="3600" dirty="0" err="1" smtClean="0"/>
-              <a:t>ddd</a:t>
-            </a:r>
-            <a:r>
-              <a:rPr lang="en-US" sz="3600" dirty="0" smtClean="0"/>
-              <a:t> </a:t>
-            </a:r>
-            <a:r>
-              <a:rPr lang="en-US" sz="3600" dirty="0" err="1" smtClean="0"/>
-              <a:t>ddddd</a:t>
-            </a:r>
-            <a:r>
-              <a:rPr lang="en-US" sz="3600" dirty="0" smtClean="0"/>
-              <a:t> </a:t>
-            </a:r>
-            <a:r>
-              <a:rPr lang="en-US" sz="3600" dirty="0" err="1" smtClean="0"/>
-              <a:t>dd</a:t>
-            </a:r>
-            <a:r>
-              <a:rPr lang="en-US" sz="3600" dirty="0" smtClean="0"/>
-              <a:t> </a:t>
-            </a:r>
-            <a:r>
-              <a:rPr lang="en-US" sz="3600" dirty="0" err="1" smtClean="0"/>
-              <a:t>dd</a:t>
-            </a:r>
-            <a:r>
-              <a:rPr lang="en-US" sz="3600" dirty="0" smtClean="0"/>
-              <a:t> d </a:t>
-            </a:r>
-            <a:r>
-              <a:rPr lang="en-US" sz="3600" dirty="0" err="1" smtClean="0"/>
-              <a:t>ddd</a:t>
-            </a:r>
-            <a:r>
-              <a:rPr lang="en-US" sz="3600" dirty="0" smtClean="0"/>
-              <a:t> </a:t>
-            </a:r>
-            <a:r>
-              <a:rPr lang="en-US" sz="3600" dirty="0" err="1" smtClean="0"/>
-              <a:t>ddd</a:t>
-            </a:r>
-            <a:endParaRPr lang="en-US" sz="3600" dirty="0" smtClean="0"/>
-          </a:p>
-          <a:p>
-            <a:pPr marL="285750" indent="-285750">
-              <a:buFont typeface="Arial" panose="020B0604020202020204" pitchFamily="34" charset="0"/>
-              <a:buChar char="•"/>
-            </a:pPr>
-            <a:r>
-              <a:rPr lang="en-US" altLang="zh-CN" dirty="0" smtClean="0"/>
-              <a:t>Test – Chinese Characters: </a:t>
-            </a:r>
-            <a:r>
-              <a:rPr lang="zh-CN" altLang="en-US" dirty="0" smtClean="0"/>
-              <a:t>阿</a:t>
-            </a:r>
-            <a:r>
-              <a:rPr lang="zh-CN" altLang="en-US" dirty="0"/>
-              <a:t>斯</a:t>
-            </a:r>
-            <a:r>
-              <a:rPr lang="zh-CN" altLang="en-US" dirty="0" smtClean="0"/>
-              <a:t>顿啊盛大速度啊盛大速度啊盛大速度</a:t>
-            </a:r>
-            <a:endParaRPr lang="en-SG" dirty="0"/>
-          </a:p>
-        </p:txBody>
-      </p:sp>
-      <p:sp>
-        <p:nvSpPr>
           <p:cNvPr id="9" name="PPTLabsHighlightBackgroundShape201506181734444083"/>
           <p:cNvSpPr>
             <a:spLocks/>
@@ -14464,6 +14424,304 @@
           <a:p>
             <a:pPr algn="ctr"/>
             <a:endParaRPr lang="en-US"/>
+          </a:p>
+        </p:txBody>
+      </p:sp>
+      <p:sp>
+        <p:nvSpPr>
+          <p:cNvPr id="2" name="HighlightBackgroundShapeea60d9b9-ed30-4da3-a1da-6902e7f48621"/>
+          <p:cNvSpPr txBox="1"/>
+          <p:nvPr/>
+        </p:nvSpPr>
+        <p:spPr>
+          <a:xfrm>
+            <a:off x="304800" y="381000"/>
+            <a:ext cx="7620000" cy="2400657"/>
+          </a:xfrm>
+          <a:prstGeom prst="rect">
+            <a:avLst/>
+          </a:prstGeom>
+          <a:noFill/>
+        </p:spPr>
+        <p:txBody>
+          <a:bodyPr wrap="square" rtlCol="0">
+            <a:spAutoFit/>
+          </a:bodyPr>
+          <a:lstStyle/>
+          <a:p>
+            <a:pPr marL="285750" indent="-285750">
+              <a:buFont typeface="Arial" panose="020B0604020202020204" pitchFamily="34" charset="0"/>
+              <a:buChar char="•"/>
+            </a:pPr>
+            <a:r>
+              <a:rPr lang="en-US" sz="2800" dirty="0" smtClean="0"/>
+              <a:t>Test - Non-ABC: 1234567890!@#$%^&amp;*()</a:t>
+            </a:r>
+          </a:p>
+          <a:p>
+            <a:r>
+              <a:rPr lang="en-US" sz="2800" dirty="0"/>
+              <a:t>Test </a:t>
+            </a:r>
+            <a:r>
+              <a:rPr lang="en-US" sz="2800" dirty="0" smtClean="0"/>
+              <a:t>– No bullet point</a:t>
+            </a:r>
+            <a:endParaRPr lang="en-US" sz="2800" dirty="0"/>
+          </a:p>
+          <a:p>
+            <a:pPr marL="514350" indent="-514350">
+              <a:buFont typeface="+mj-lt"/>
+              <a:buAutoNum type="arabicPeriod"/>
+            </a:pPr>
+            <a:r>
+              <a:rPr lang="en-US" sz="2800" dirty="0"/>
+              <a:t>Test – </a:t>
+            </a:r>
+            <a:r>
+              <a:rPr lang="en-US" sz="2800" dirty="0" smtClean="0"/>
+              <a:t>Different bullet point</a:t>
+            </a:r>
+          </a:p>
+          <a:p>
+            <a:pPr marL="285750" indent="-285750">
+              <a:buFont typeface="Arial" panose="020B0604020202020204" pitchFamily="34" charset="0"/>
+              <a:buChar char="•"/>
+            </a:pPr>
+            <a:r>
+              <a:rPr lang="en-US" sz="2800" dirty="0" smtClean="0">
+                <a:latin typeface="Times New Roman" panose="02020603050405020304" pitchFamily="18" charset="0"/>
+                <a:cs typeface="Times New Roman" panose="02020603050405020304" pitchFamily="18" charset="0"/>
+              </a:rPr>
+              <a:t>Test - Another Font Family, using Times New Roman</a:t>
+            </a:r>
+          </a:p>
+          <a:p>
+            <a:pPr marL="285750" indent="-285750">
+              <a:buFont typeface="Arial" panose="020B0604020202020204" pitchFamily="34" charset="0"/>
+              <a:buChar char="•"/>
+            </a:pPr>
+            <a:r>
+              <a:rPr lang="en-US" sz="1000" dirty="0" smtClean="0"/>
+              <a:t>Test - very small content. Test: very small content. Test: very small content. Test: very small content</a:t>
+            </a:r>
+          </a:p>
+        </p:txBody>
+      </p:sp>
+      <p:sp>
+        <p:nvSpPr>
+          <p:cNvPr id="3" name="HighlightBackgroundShapec485a6a5-1d97-42dc-ab66-ce7355d7009d"/>
+          <p:cNvSpPr txBox="1"/>
+          <p:nvPr/>
+        </p:nvSpPr>
+        <p:spPr>
+          <a:xfrm>
+            <a:off x="1524000" y="3048000"/>
+            <a:ext cx="7620000" cy="3600986"/>
+          </a:xfrm>
+          <a:prstGeom prst="rect">
+            <a:avLst/>
+          </a:prstGeom>
+          <a:noFill/>
+        </p:spPr>
+        <p:txBody>
+          <a:bodyPr wrap="square" rtlCol="0">
+            <a:spAutoFit/>
+          </a:bodyPr>
+          <a:lstStyle/>
+          <a:p>
+            <a:pPr marL="285750" indent="-285750">
+              <a:buFont typeface="Arial" panose="020B0604020202020204" pitchFamily="34" charset="0"/>
+              <a:buChar char="•"/>
+            </a:pPr>
+            <a:r>
+              <a:rPr lang="en-US" sz="6600" dirty="0" smtClean="0">
+                <a:latin typeface="Arial Black" panose="020B0A04020102020204" pitchFamily="34" charset="0"/>
+              </a:rPr>
+              <a:t>Test - very big</a:t>
+            </a:r>
+          </a:p>
+          <a:p>
+            <a:pPr marL="285750" indent="-285750">
+              <a:buFont typeface="Arial" panose="020B0604020202020204" pitchFamily="34" charset="0"/>
+              <a:buChar char="•"/>
+            </a:pPr>
+            <a:r>
+              <a:rPr lang="en-US" sz="3600" dirty="0" smtClean="0"/>
+              <a:t>Test – Long sentence: </a:t>
+            </a:r>
+            <a:r>
+              <a:rPr lang="en-US" sz="3600" dirty="0" err="1" smtClean="0"/>
+              <a:t>Asdddd</a:t>
+            </a:r>
+            <a:r>
+              <a:rPr lang="en-US" sz="3600" dirty="0" smtClean="0"/>
+              <a:t> </a:t>
+            </a:r>
+            <a:r>
+              <a:rPr lang="en-US" sz="3600" dirty="0" err="1" smtClean="0"/>
+              <a:t>ddd</a:t>
+            </a:r>
+            <a:r>
+              <a:rPr lang="en-US" sz="3600" dirty="0" smtClean="0"/>
+              <a:t> </a:t>
+            </a:r>
+            <a:r>
+              <a:rPr lang="en-US" sz="3600" dirty="0" err="1" smtClean="0"/>
+              <a:t>dd</a:t>
+            </a:r>
+            <a:r>
+              <a:rPr lang="en-US" sz="3600" dirty="0" smtClean="0"/>
+              <a:t> d </a:t>
+            </a:r>
+            <a:r>
+              <a:rPr lang="en-US" sz="3600" dirty="0" err="1" smtClean="0"/>
+              <a:t>ddddd</a:t>
+            </a:r>
+            <a:r>
+              <a:rPr lang="en-US" sz="3600" dirty="0" smtClean="0"/>
+              <a:t> </a:t>
+            </a:r>
+            <a:r>
+              <a:rPr lang="en-US" sz="3600" dirty="0" err="1" smtClean="0"/>
+              <a:t>ddd</a:t>
+            </a:r>
+            <a:r>
+              <a:rPr lang="en-US" sz="3600" dirty="0" smtClean="0"/>
+              <a:t> </a:t>
+            </a:r>
+            <a:r>
+              <a:rPr lang="en-US" sz="3600" dirty="0" err="1" smtClean="0"/>
+              <a:t>ddd</a:t>
+            </a:r>
+            <a:r>
+              <a:rPr lang="en-US" sz="3600" dirty="0" smtClean="0"/>
+              <a:t> </a:t>
+            </a:r>
+            <a:r>
+              <a:rPr lang="en-US" sz="3600" dirty="0" err="1" smtClean="0"/>
+              <a:t>ddd</a:t>
+            </a:r>
+            <a:r>
+              <a:rPr lang="en-US" sz="3600" dirty="0" smtClean="0"/>
+              <a:t> </a:t>
+            </a:r>
+            <a:r>
+              <a:rPr lang="en-US" sz="3600" dirty="0" err="1" smtClean="0"/>
+              <a:t>ddd</a:t>
+            </a:r>
+            <a:r>
+              <a:rPr lang="en-US" sz="3600" dirty="0" smtClean="0"/>
+              <a:t> </a:t>
+            </a:r>
+            <a:r>
+              <a:rPr lang="en-US" sz="3600" dirty="0" err="1" smtClean="0"/>
+              <a:t>ddd</a:t>
+            </a:r>
+            <a:r>
+              <a:rPr lang="en-US" sz="3600" dirty="0" smtClean="0"/>
+              <a:t> </a:t>
+            </a:r>
+            <a:r>
+              <a:rPr lang="en-US" sz="3600" dirty="0" err="1" smtClean="0"/>
+              <a:t>ddd</a:t>
+            </a:r>
+            <a:r>
+              <a:rPr lang="en-US" sz="3600" dirty="0" smtClean="0"/>
+              <a:t> </a:t>
+            </a:r>
+            <a:r>
+              <a:rPr lang="en-US" sz="3600" dirty="0" err="1" smtClean="0"/>
+              <a:t>ddd</a:t>
+            </a:r>
+            <a:r>
+              <a:rPr lang="en-US" sz="3600" dirty="0" smtClean="0"/>
+              <a:t> </a:t>
+            </a:r>
+            <a:r>
+              <a:rPr lang="en-US" sz="3600" dirty="0" err="1" smtClean="0"/>
+              <a:t>dddddd</a:t>
+            </a:r>
+            <a:r>
+              <a:rPr lang="en-US" sz="3600" dirty="0" smtClean="0"/>
+              <a:t> </a:t>
+            </a:r>
+            <a:r>
+              <a:rPr lang="en-US" sz="3600" dirty="0" err="1" smtClean="0"/>
+              <a:t>dd</a:t>
+            </a:r>
+            <a:r>
+              <a:rPr lang="en-US" sz="3600" dirty="0" smtClean="0"/>
+              <a:t> </a:t>
+            </a:r>
+            <a:r>
+              <a:rPr lang="en-US" sz="3600" dirty="0" err="1" smtClean="0"/>
+              <a:t>ddd</a:t>
+            </a:r>
+            <a:r>
+              <a:rPr lang="en-US" sz="3600" dirty="0" smtClean="0"/>
+              <a:t> </a:t>
+            </a:r>
+            <a:r>
+              <a:rPr lang="en-US" sz="3600" dirty="0" err="1" smtClean="0"/>
+              <a:t>ddddd</a:t>
+            </a:r>
+            <a:r>
+              <a:rPr lang="en-US" sz="3600" dirty="0" smtClean="0"/>
+              <a:t> </a:t>
+            </a:r>
+            <a:r>
+              <a:rPr lang="en-US" sz="3600" dirty="0" err="1" smtClean="0"/>
+              <a:t>dd</a:t>
+            </a:r>
+            <a:r>
+              <a:rPr lang="en-US" sz="3600" dirty="0" smtClean="0"/>
+              <a:t> </a:t>
+            </a:r>
+            <a:r>
+              <a:rPr lang="en-US" sz="3600" dirty="0" err="1" smtClean="0"/>
+              <a:t>dd</a:t>
+            </a:r>
+            <a:r>
+              <a:rPr lang="en-US" sz="3600" dirty="0" smtClean="0"/>
+              <a:t> d </a:t>
+            </a:r>
+            <a:r>
+              <a:rPr lang="en-US" sz="3600" dirty="0" err="1" smtClean="0"/>
+              <a:t>ddd</a:t>
+            </a:r>
+            <a:r>
+              <a:rPr lang="en-US" sz="3600" dirty="0" smtClean="0"/>
+              <a:t> </a:t>
+            </a:r>
+            <a:r>
+              <a:rPr lang="en-US" sz="3600" dirty="0" err="1" smtClean="0"/>
+              <a:t>ddd</a:t>
+            </a:r>
+            <a:endParaRPr lang="en-US" sz="3600" dirty="0" smtClean="0"/>
+          </a:p>
+          <a:p>
+            <a:pPr marL="285750" indent="-285750">
+              <a:buFont typeface="Arial" panose="020B0604020202020204" pitchFamily="34" charset="0"/>
+              <a:buChar char="•"/>
+            </a:pPr>
+            <a:r>
+              <a:rPr lang="en-US" altLang="zh-CN" dirty="0" smtClean="0"/>
+              <a:t>Test – Chinese Characters: </a:t>
+            </a:r>
+            <a:r>
+              <a:rPr lang="zh-CN" altLang="en-US" dirty="0" smtClean="0"/>
+              <a:t>阿</a:t>
+            </a:r>
+            <a:r>
+              <a:rPr lang="zh-CN" altLang="en-US" dirty="0"/>
+              <a:t>斯</a:t>
+            </a:r>
+            <a:r>
+              <a:rPr lang="zh-CN" altLang="en-US" dirty="0" smtClean="0"/>
+              <a:t>顿啊盛大速度啊盛大速度啊盛大速度</a:t>
+            </a:r>
+            <a:endParaRPr lang="en-SG" dirty="0"/>
           </a:p>
         </p:txBody>
       </p:sp>
@@ -15580,6 +15838,49 @@
       </p:grpSpPr>
       <p:sp>
         <p:nvSpPr>
+          <p:cNvPr id="3" name="Rectangle 4"/>
+          <p:cNvSpPr/>
+          <p:nvPr/>
+        </p:nvSpPr>
+        <p:spPr>
+          <a:xfrm>
+            <a:off x="0" y="2286000"/>
+            <a:ext cx="9144000" cy="2209800"/>
+          </a:xfrm>
+          <a:prstGeom prst="rect">
+            <a:avLst/>
+          </a:prstGeom>
+          <a:solidFill>
+            <a:srgbClr val="002060"/>
+          </a:solidFill>
+        </p:spPr>
+        <p:style>
+          <a:lnRef idx="2">
+            <a:schemeClr val="accent1">
+              <a:shade val="50000"/>
+            </a:schemeClr>
+          </a:lnRef>
+          <a:fillRef idx="1">
+            <a:schemeClr val="accent1"/>
+          </a:fillRef>
+          <a:effectRef idx="0">
+            <a:schemeClr val="accent1"/>
+          </a:effectRef>
+          <a:fontRef idx="minor">
+            <a:schemeClr val="lt1"/>
+          </a:fontRef>
+        </p:style>
+        <p:txBody>
+          <a:bodyPr rtlCol="0" anchor="ctr"/>
+          <a:lstStyle/>
+          <a:p>
+            <a:pPr algn="ctr"/>
+            <a:endParaRPr lang="en-US"/>
+          </a:p>
+        </p:txBody>
+      </p:sp>
+      <p:sp>
+        <p:nvSpPr>
           <p:cNvPr id="2" name="First Textbox"/>
           <p:cNvSpPr txBox="1"/>
           <p:nvPr/>
@@ -16153,6 +16454,49 @@
           <a:chExt cx="0" cy="0"/>
         </a:xfrm>
       </p:grpSpPr>
+      <p:sp>
+        <p:nvSpPr>
+          <p:cNvPr id="11" name="Rectangle 4"/>
+          <p:cNvSpPr/>
+          <p:nvPr/>
+        </p:nvSpPr>
+        <p:spPr>
+          <a:xfrm>
+            <a:off x="0" y="2286000"/>
+            <a:ext cx="9144000" cy="2209800"/>
+          </a:xfrm>
+          <a:prstGeom prst="rect">
+            <a:avLst/>
+          </a:prstGeom>
+          <a:solidFill>
+            <a:srgbClr val="002060"/>
+          </a:solidFill>
+        </p:spPr>
+        <p:style>
+          <a:lnRef idx="2">
+            <a:schemeClr val="accent1">
+              <a:shade val="50000"/>
+            </a:schemeClr>
+          </a:lnRef>
+          <a:fillRef idx="1">
+            <a:schemeClr val="accent1"/>
+          </a:fillRef>
+          <a:effectRef idx="0">
+            <a:schemeClr val="accent1"/>
+          </a:effectRef>
+          <a:fontRef idx="minor">
+            <a:schemeClr val="lt1"/>
+          </a:fontRef>
+        </p:style>
+        <p:txBody>
+          <a:bodyPr rtlCol="0" anchor="ctr"/>
+          <a:lstStyle/>
+          <a:p>
+            <a:pPr algn="ctr"/>
+            <a:endParaRPr lang="en-US"/>
+          </a:p>
+        </p:txBody>
+      </p:sp>
       <p:sp>
         <p:nvSpPr>
           <p:cNvPr id="3" name="PPTLabsHighlightBackgroundShape201506181734253032"/>
@@ -18140,6 +18484,49 @@
       </p:grpSpPr>
       <p:sp>
         <p:nvSpPr>
+          <p:cNvPr id="5" name="Rectangle 4"/>
+          <p:cNvSpPr/>
+          <p:nvPr/>
+        </p:nvSpPr>
+        <p:spPr>
+          <a:xfrm>
+            <a:off x="0" y="2286000"/>
+            <a:ext cx="9144000" cy="2209800"/>
+          </a:xfrm>
+          <a:prstGeom prst="rect">
+            <a:avLst/>
+          </a:prstGeom>
+          <a:solidFill>
+            <a:srgbClr val="002060"/>
+          </a:solidFill>
+        </p:spPr>
+        <p:style>
+          <a:lnRef idx="2">
+            <a:schemeClr val="accent1">
+              <a:shade val="50000"/>
+            </a:schemeClr>
+          </a:lnRef>
+          <a:fillRef idx="1">
+            <a:schemeClr val="accent1"/>
+          </a:fillRef>
+          <a:effectRef idx="0">
+            <a:schemeClr val="accent1"/>
+          </a:effectRef>
+          <a:fontRef idx="minor">
+            <a:schemeClr val="lt1"/>
+          </a:fontRef>
+        </p:style>
+        <p:txBody>
+          <a:bodyPr rtlCol="0" anchor="ctr"/>
+          <a:lstStyle/>
+          <a:p>
+            <a:pPr algn="ctr"/>
+            <a:endParaRPr lang="en-US"/>
+          </a:p>
+        </p:txBody>
+      </p:sp>
+      <p:sp>
+        <p:nvSpPr>
           <p:cNvPr id="2" name="First Textbox"/>
           <p:cNvSpPr txBox="1"/>
           <p:nvPr/>
@@ -18506,6 +18893,49 @@
           <a:chExt cx="0" cy="0"/>
         </a:xfrm>
       </p:grpSpPr>
+      <p:sp>
+        <p:nvSpPr>
+          <p:cNvPr id="5" name="Rectangle 4"/>
+          <p:cNvSpPr/>
+          <p:nvPr/>
+        </p:nvSpPr>
+        <p:spPr>
+          <a:xfrm>
+            <a:off x="0" y="2286000"/>
+            <a:ext cx="9144000" cy="2209800"/>
+          </a:xfrm>
+          <a:prstGeom prst="rect">
+            <a:avLst/>
+          </a:prstGeom>
+          <a:solidFill>
+            <a:srgbClr val="002060"/>
+          </a:solidFill>
+        </p:spPr>
+        <p:style>
+          <a:lnRef idx="2">
+            <a:schemeClr val="accent1">
+              <a:shade val="50000"/>
+            </a:schemeClr>
+          </a:lnRef>
+          <a:fillRef idx="1">
+            <a:schemeClr val="accent1"/>
+          </a:fillRef>
+          <a:effectRef idx="0">
+            <a:schemeClr val="accent1"/>
+          </a:effectRef>
+          <a:fontRef idx="minor">
+            <a:schemeClr val="lt1"/>
+          </a:fontRef>
+        </p:style>
+        <p:txBody>
+          <a:bodyPr rtlCol="0" anchor="ctr"/>
+          <a:lstStyle/>
+          <a:p>
+            <a:pPr algn="ctr"/>
+            <a:endParaRPr lang="en-US"/>
+          </a:p>
+        </p:txBody>
+      </p:sp>
       <p:sp>
         <p:nvSpPr>
           <p:cNvPr id="2" name="HighlightTextShape201506181207499333"/>
@@ -19530,6 +19960,49 @@
       </p:grpSpPr>
       <p:sp>
         <p:nvSpPr>
+          <p:cNvPr id="5" name="Rectangle 4"/>
+          <p:cNvSpPr/>
+          <p:nvPr/>
+        </p:nvSpPr>
+        <p:spPr>
+          <a:xfrm>
+            <a:off x="0" y="2286000"/>
+            <a:ext cx="9144000" cy="2209800"/>
+          </a:xfrm>
+          <a:prstGeom prst="rect">
+            <a:avLst/>
+          </a:prstGeom>
+          <a:solidFill>
+            <a:srgbClr val="002060"/>
+          </a:solidFill>
+        </p:spPr>
+        <p:style>
+          <a:lnRef idx="2">
+            <a:schemeClr val="accent1">
+              <a:shade val="50000"/>
+            </a:schemeClr>
+          </a:lnRef>
+          <a:fillRef idx="1">
+            <a:schemeClr val="accent1"/>
+          </a:fillRef>
+          <a:effectRef idx="0">
+            <a:schemeClr val="accent1"/>
+          </a:effectRef>
+          <a:fontRef idx="minor">
+            <a:schemeClr val="lt1"/>
+          </a:fontRef>
+        </p:style>
+        <p:txBody>
+          <a:bodyPr rtlCol="0" anchor="ctr"/>
+          <a:lstStyle/>
+          <a:p>
+            <a:pPr algn="ctr"/>
+            <a:endParaRPr lang="en-US"/>
+          </a:p>
+        </p:txBody>
+      </p:sp>
+      <p:sp>
+        <p:nvSpPr>
           <p:cNvPr id="2" name="First Textbox"/>
           <p:cNvSpPr txBox="1"/>
           <p:nvPr/>
@@ -19896,6 +20369,49 @@
           <a:chExt cx="0" cy="0"/>
         </a:xfrm>
       </p:grpSpPr>
+      <p:sp>
+        <p:nvSpPr>
+          <p:cNvPr id="5" name="Rectangle 4"/>
+          <p:cNvSpPr/>
+          <p:nvPr/>
+        </p:nvSpPr>
+        <p:spPr>
+          <a:xfrm>
+            <a:off x="0" y="2286000"/>
+            <a:ext cx="9144000" cy="2209800"/>
+          </a:xfrm>
+          <a:prstGeom prst="rect">
+            <a:avLst/>
+          </a:prstGeom>
+          <a:solidFill>
+            <a:srgbClr val="002060"/>
+          </a:solidFill>
+        </p:spPr>
+        <p:style>
+          <a:lnRef idx="2">
+            <a:schemeClr val="accent1">
+              <a:shade val="50000"/>
+            </a:schemeClr>
+          </a:lnRef>
+          <a:fillRef idx="1">
+            <a:schemeClr val="accent1"/>
+          </a:fillRef>
+          <a:effectRef idx="0">
+            <a:schemeClr val="accent1"/>
+          </a:effectRef>
+          <a:fontRef idx="minor">
+            <a:schemeClr val="lt1"/>
+          </a:fontRef>
+        </p:style>
+        <p:txBody>
+          <a:bodyPr rtlCol="0" anchor="ctr"/>
+          <a:lstStyle/>
+          <a:p>
+            <a:pPr algn="ctr"/>
+            <a:endParaRPr lang="en-US"/>
+          </a:p>
+        </p:txBody>
+      </p:sp>
       <p:sp>
         <p:nvSpPr>
           <p:cNvPr id="2" name="HighlightTextShape201506181158112213"/>

</xml_diff>

<commit_message>
Add test for select end of textbox
</commit_message>
<xml_diff>
--- a/doc/test/HighlightPoints.pptx
+++ b/doc/test/HighlightPoints.pptx
@@ -7,7 +7,7 @@
     <p:sldMasterId id="2147483672" r:id="rId3"/>
   </p:sldMasterIdLst>
   <p:notesMasterIdLst>
-    <p:notesMasterId r:id="rId25"/>
+    <p:notesMasterId r:id="rId28"/>
   </p:notesMasterIdLst>
   <p:sldIdLst>
     <p:sldId id="287" r:id="rId4"/>
@@ -30,7 +30,10 @@
     <p:sldId id="323" r:id="rId21"/>
     <p:sldId id="324" r:id="rId22"/>
     <p:sldId id="329" r:id="rId23"/>
-    <p:sldId id="305" r:id="rId24"/>
+    <p:sldId id="334" r:id="rId24"/>
+    <p:sldId id="333" r:id="rId25"/>
+    <p:sldId id="335" r:id="rId26"/>
+    <p:sldId id="305" r:id="rId27"/>
   </p:sldIdLst>
   <p:sldSz cx="9144000" cy="6858000" type="screen4x3"/>
   <p:notesSz cx="6858000" cy="9144000"/>
@@ -158,13 +161,16 @@
             <p14:sldId id="323"/>
             <p14:sldId id="324"/>
             <p14:sldId id="329"/>
+            <p14:sldId id="334"/>
+            <p14:sldId id="333"/>
+            <p14:sldId id="335"/>
             <p14:sldId id="305"/>
           </p14:sldIdLst>
         </p14:section>
       </p14:sectionLst>
     </p:ext>
     <p:ext uri="{EFAFB233-063F-42B5-8137-9DF3F51BA10A}">
-      <p15:sldGuideLst xmlns:p15="http://schemas.microsoft.com/office/powerpoint/2012/main" xmlns="">
+      <p15:sldGuideLst xmlns:p15="http://schemas.microsoft.com/office/powerpoint/2012/main">
         <p15:guide id="1" orient="horz" pos="2160">
           <p15:clr>
             <a:srgbClr val="A4A3A4"/>
@@ -263,7 +269,7 @@
           <a:p>
             <a:fld id="{7B6B14F6-3F9A-43ED-BCC2-4547CC5017BD}" type="datetimeFigureOut">
               <a:rPr lang="en-SG" smtClean="0"/>
-              <a:t>19/6/2015</a:t>
+              <a:t>2/7/2017</a:t>
             </a:fld>
             <a:endParaRPr lang="en-SG"/>
           </a:p>
@@ -712,7 +718,7 @@
           <a:p>
             <a:fld id="{699DC775-C286-4358-8C92-D7E584E969B3}" type="datetimeFigureOut">
               <a:rPr lang="en-US" smtClean="0"/>
-              <a:t>19-Jun-15</a:t>
+              <a:t>2/7/2017</a:t>
             </a:fld>
             <a:endParaRPr lang="en-US"/>
           </a:p>
@@ -882,7 +888,7 @@
           <a:p>
             <a:fld id="{699DC775-C286-4358-8C92-D7E584E969B3}" type="datetimeFigureOut">
               <a:rPr lang="en-US" smtClean="0"/>
-              <a:t>19-Jun-15</a:t>
+              <a:t>2/7/2017</a:t>
             </a:fld>
             <a:endParaRPr lang="en-US"/>
           </a:p>
@@ -1062,7 +1068,7 @@
           <a:p>
             <a:fld id="{699DC775-C286-4358-8C92-D7E584E969B3}" type="datetimeFigureOut">
               <a:rPr lang="en-US" smtClean="0"/>
-              <a:t>19-Jun-15</a:t>
+              <a:t>2/7/2017</a:t>
             </a:fld>
             <a:endParaRPr lang="en-US"/>
           </a:p>
@@ -1304,7 +1310,7 @@
           <a:p>
             <a:fld id="{699DC775-C286-4358-8C92-D7E584E969B3}" type="datetimeFigureOut">
               <a:rPr lang="en-US" smtClean="0"/>
-              <a:t>19-Jun-15</a:t>
+              <a:t>2/7/2017</a:t>
             </a:fld>
             <a:endParaRPr lang="en-US"/>
           </a:p>
@@ -1474,7 +1480,7 @@
           <a:p>
             <a:fld id="{699DC775-C286-4358-8C92-D7E584E969B3}" type="datetimeFigureOut">
               <a:rPr lang="en-US" smtClean="0"/>
-              <a:t>19-Jun-15</a:t>
+              <a:t>2/7/2017</a:t>
             </a:fld>
             <a:endParaRPr lang="en-US"/>
           </a:p>
@@ -1720,7 +1726,7 @@
           <a:p>
             <a:fld id="{699DC775-C286-4358-8C92-D7E584E969B3}" type="datetimeFigureOut">
               <a:rPr lang="en-US" smtClean="0"/>
-              <a:t>19-Jun-15</a:t>
+              <a:t>2/7/2017</a:t>
             </a:fld>
             <a:endParaRPr lang="en-US"/>
           </a:p>
@@ -2008,7 +2014,7 @@
           <a:p>
             <a:fld id="{699DC775-C286-4358-8C92-D7E584E969B3}" type="datetimeFigureOut">
               <a:rPr lang="en-US" smtClean="0"/>
-              <a:t>19-Jun-15</a:t>
+              <a:t>2/7/2017</a:t>
             </a:fld>
             <a:endParaRPr lang="en-US"/>
           </a:p>
@@ -2430,7 +2436,7 @@
           <a:p>
             <a:fld id="{699DC775-C286-4358-8C92-D7E584E969B3}" type="datetimeFigureOut">
               <a:rPr lang="en-US" smtClean="0"/>
-              <a:t>19-Jun-15</a:t>
+              <a:t>2/7/2017</a:t>
             </a:fld>
             <a:endParaRPr lang="en-US"/>
           </a:p>
@@ -2548,7 +2554,7 @@
           <a:p>
             <a:fld id="{699DC775-C286-4358-8C92-D7E584E969B3}" type="datetimeFigureOut">
               <a:rPr lang="en-US" smtClean="0"/>
-              <a:t>19-Jun-15</a:t>
+              <a:t>2/7/2017</a:t>
             </a:fld>
             <a:endParaRPr lang="en-US"/>
           </a:p>
@@ -2643,7 +2649,7 @@
           <a:p>
             <a:fld id="{699DC775-C286-4358-8C92-D7E584E969B3}" type="datetimeFigureOut">
               <a:rPr lang="en-US" smtClean="0"/>
-              <a:t>19-Jun-15</a:t>
+              <a:t>2/7/2017</a:t>
             </a:fld>
             <a:endParaRPr lang="en-US"/>
           </a:p>
@@ -2920,7 +2926,7 @@
           <a:p>
             <a:fld id="{699DC775-C286-4358-8C92-D7E584E969B3}" type="datetimeFigureOut">
               <a:rPr lang="en-US" smtClean="0"/>
-              <a:t>19-Jun-15</a:t>
+              <a:t>2/7/2017</a:t>
             </a:fld>
             <a:endParaRPr lang="en-US"/>
           </a:p>
@@ -3090,7 +3096,7 @@
           <a:p>
             <a:fld id="{699DC775-C286-4358-8C92-D7E584E969B3}" type="datetimeFigureOut">
               <a:rPr lang="en-US" smtClean="0"/>
-              <a:t>19-Jun-15</a:t>
+              <a:t>2/7/2017</a:t>
             </a:fld>
             <a:endParaRPr lang="en-US"/>
           </a:p>
@@ -3343,7 +3349,7 @@
           <a:p>
             <a:fld id="{699DC775-C286-4358-8C92-D7E584E969B3}" type="datetimeFigureOut">
               <a:rPr lang="en-US" smtClean="0"/>
-              <a:t>19-Jun-15</a:t>
+              <a:t>2/7/2017</a:t>
             </a:fld>
             <a:endParaRPr lang="en-US"/>
           </a:p>
@@ -3513,7 +3519,7 @@
           <a:p>
             <a:fld id="{699DC775-C286-4358-8C92-D7E584E969B3}" type="datetimeFigureOut">
               <a:rPr lang="en-US" smtClean="0"/>
-              <a:t>19-Jun-15</a:t>
+              <a:t>2/7/2017</a:t>
             </a:fld>
             <a:endParaRPr lang="en-US"/>
           </a:p>
@@ -3693,7 +3699,7 @@
           <a:p>
             <a:fld id="{699DC775-C286-4358-8C92-D7E584E969B3}" type="datetimeFigureOut">
               <a:rPr lang="en-US" smtClean="0"/>
-              <a:t>19-Jun-15</a:t>
+              <a:t>2/7/2017</a:t>
             </a:fld>
             <a:endParaRPr lang="en-US"/>
           </a:p>
@@ -3943,7 +3949,7 @@
           <a:p>
             <a:fld id="{699DC775-C286-4358-8C92-D7E584E969B3}" type="datetimeFigureOut">
               <a:rPr lang="en-US" smtClean="0"/>
-              <a:t>19-Jun-15</a:t>
+              <a:t>2/7/2017</a:t>
             </a:fld>
             <a:endParaRPr lang="en-US"/>
           </a:p>
@@ -4121,7 +4127,7 @@
           <a:p>
             <a:fld id="{699DC775-C286-4358-8C92-D7E584E969B3}" type="datetimeFigureOut">
               <a:rPr lang="en-US" smtClean="0"/>
-              <a:t>19-Jun-15</a:t>
+              <a:t>2/7/2017</a:t>
             </a:fld>
             <a:endParaRPr lang="en-US"/>
           </a:p>
@@ -4375,7 +4381,7 @@
           <a:p>
             <a:fld id="{699DC775-C286-4358-8C92-D7E584E969B3}" type="datetimeFigureOut">
               <a:rPr lang="en-US" smtClean="0"/>
-              <a:t>19-Jun-15</a:t>
+              <a:t>2/7/2017</a:t>
             </a:fld>
             <a:endParaRPr lang="en-US"/>
           </a:p>
@@ -4671,7 +4677,7 @@
           <a:p>
             <a:fld id="{699DC775-C286-4358-8C92-D7E584E969B3}" type="datetimeFigureOut">
               <a:rPr lang="en-US" smtClean="0"/>
-              <a:t>19-Jun-15</a:t>
+              <a:t>2/7/2017</a:t>
             </a:fld>
             <a:endParaRPr lang="en-US"/>
           </a:p>
@@ -5101,7 +5107,7 @@
           <a:p>
             <a:fld id="{699DC775-C286-4358-8C92-D7E584E969B3}" type="datetimeFigureOut">
               <a:rPr lang="en-US" smtClean="0"/>
-              <a:t>19-Jun-15</a:t>
+              <a:t>2/7/2017</a:t>
             </a:fld>
             <a:endParaRPr lang="en-US"/>
           </a:p>
@@ -5227,7 +5233,7 @@
           <a:p>
             <a:fld id="{699DC775-C286-4358-8C92-D7E584E969B3}" type="datetimeFigureOut">
               <a:rPr lang="en-US" smtClean="0"/>
-              <a:t>19-Jun-15</a:t>
+              <a:t>2/7/2017</a:t>
             </a:fld>
             <a:endParaRPr lang="en-US"/>
           </a:p>
@@ -5330,7 +5336,7 @@
           <a:p>
             <a:fld id="{699DC775-C286-4358-8C92-D7E584E969B3}" type="datetimeFigureOut">
               <a:rPr lang="en-US" smtClean="0"/>
-              <a:t>19-Jun-15</a:t>
+              <a:t>2/7/2017</a:t>
             </a:fld>
             <a:endParaRPr lang="en-US"/>
           </a:p>
@@ -5576,7 +5582,7 @@
           <a:p>
             <a:fld id="{699DC775-C286-4358-8C92-D7E584E969B3}" type="datetimeFigureOut">
               <a:rPr lang="en-US" smtClean="0"/>
-              <a:t>19-Jun-15</a:t>
+              <a:t>2/7/2017</a:t>
             </a:fld>
             <a:endParaRPr lang="en-US"/>
           </a:p>
@@ -5861,7 +5867,7 @@
           <a:p>
             <a:fld id="{699DC775-C286-4358-8C92-D7E584E969B3}" type="datetimeFigureOut">
               <a:rPr lang="en-US" smtClean="0"/>
-              <a:t>19-Jun-15</a:t>
+              <a:t>2/7/2017</a:t>
             </a:fld>
             <a:endParaRPr lang="en-US"/>
           </a:p>
@@ -6122,7 +6128,7 @@
           <a:p>
             <a:fld id="{699DC775-C286-4358-8C92-D7E584E969B3}" type="datetimeFigureOut">
               <a:rPr lang="en-US" smtClean="0"/>
-              <a:t>19-Jun-15</a:t>
+              <a:t>2/7/2017</a:t>
             </a:fld>
             <a:endParaRPr lang="en-US"/>
           </a:p>
@@ -6300,7 +6306,7 @@
           <a:p>
             <a:fld id="{699DC775-C286-4358-8C92-D7E584E969B3}" type="datetimeFigureOut">
               <a:rPr lang="en-US" smtClean="0"/>
-              <a:t>19-Jun-15</a:t>
+              <a:t>2/7/2017</a:t>
             </a:fld>
             <a:endParaRPr lang="en-US"/>
           </a:p>
@@ -6488,7 +6494,7 @@
           <a:p>
             <a:fld id="{699DC775-C286-4358-8C92-D7E584E969B3}" type="datetimeFigureOut">
               <a:rPr lang="en-US" smtClean="0"/>
-              <a:t>19-Jun-15</a:t>
+              <a:t>2/7/2017</a:t>
             </a:fld>
             <a:endParaRPr lang="en-US"/>
           </a:p>
@@ -6776,7 +6782,7 @@
           <a:p>
             <a:fld id="{699DC775-C286-4358-8C92-D7E584E969B3}" type="datetimeFigureOut">
               <a:rPr lang="en-US" smtClean="0"/>
-              <a:t>19-Jun-15</a:t>
+              <a:t>2/7/2017</a:t>
             </a:fld>
             <a:endParaRPr lang="en-US"/>
           </a:p>
@@ -7198,7 +7204,7 @@
           <a:p>
             <a:fld id="{699DC775-C286-4358-8C92-D7E584E969B3}" type="datetimeFigureOut">
               <a:rPr lang="en-US" smtClean="0"/>
-              <a:t>19-Jun-15</a:t>
+              <a:t>2/7/2017</a:t>
             </a:fld>
             <a:endParaRPr lang="en-US"/>
           </a:p>
@@ -7316,7 +7322,7 @@
           <a:p>
             <a:fld id="{699DC775-C286-4358-8C92-D7E584E969B3}" type="datetimeFigureOut">
               <a:rPr lang="en-US" smtClean="0"/>
-              <a:t>19-Jun-15</a:t>
+              <a:t>2/7/2017</a:t>
             </a:fld>
             <a:endParaRPr lang="en-US"/>
           </a:p>
@@ -7411,7 +7417,7 @@
           <a:p>
             <a:fld id="{699DC775-C286-4358-8C92-D7E584E969B3}" type="datetimeFigureOut">
               <a:rPr lang="en-US" smtClean="0"/>
-              <a:t>19-Jun-15</a:t>
+              <a:t>2/7/2017</a:t>
             </a:fld>
             <a:endParaRPr lang="en-US"/>
           </a:p>
@@ -7688,7 +7694,7 @@
           <a:p>
             <a:fld id="{699DC775-C286-4358-8C92-D7E584E969B3}" type="datetimeFigureOut">
               <a:rPr lang="en-US" smtClean="0"/>
-              <a:t>19-Jun-15</a:t>
+              <a:t>2/7/2017</a:t>
             </a:fld>
             <a:endParaRPr lang="en-US"/>
           </a:p>
@@ -7941,7 +7947,7 @@
           <a:p>
             <a:fld id="{699DC775-C286-4358-8C92-D7E584E969B3}" type="datetimeFigureOut">
               <a:rPr lang="en-US" smtClean="0"/>
-              <a:t>19-Jun-15</a:t>
+              <a:t>2/7/2017</a:t>
             </a:fld>
             <a:endParaRPr lang="en-US"/>
           </a:p>
@@ -8154,7 +8160,7 @@
           <a:p>
             <a:fld id="{699DC775-C286-4358-8C92-D7E584E969B3}" type="datetimeFigureOut">
               <a:rPr lang="en-US" smtClean="0"/>
-              <a:t>19-Jun-15</a:t>
+              <a:t>2/7/2017</a:t>
             </a:fld>
             <a:endParaRPr lang="en-US"/>
           </a:p>
@@ -8669,7 +8675,7 @@
           <a:p>
             <a:fld id="{699DC775-C286-4358-8C92-D7E584E969B3}" type="datetimeFigureOut">
               <a:rPr lang="en-US" smtClean="0"/>
-              <a:t>19-Jun-15</a:t>
+              <a:t>2/7/2017</a:t>
             </a:fld>
             <a:endParaRPr lang="en-US"/>
           </a:p>
@@ -9182,7 +9188,7 @@
           <a:p>
             <a:fld id="{699DC775-C286-4358-8C92-D7E584E969B3}" type="datetimeFigureOut">
               <a:rPr lang="en-US" smtClean="0"/>
-              <a:t>19-Jun-15</a:t>
+              <a:t>2/7/2017</a:t>
             </a:fld>
             <a:endParaRPr lang="en-US"/>
           </a:p>
@@ -18303,6 +18309,951 @@
 </file>
 
 <file path=ppt/slides/slide21.xml><?xml version="1.0" encoding="utf-8"?>
+<p:sld xmlns:a="http://schemas.openxmlformats.org/drawingml/2006/main" xmlns:r="http://schemas.openxmlformats.org/officeDocument/2006/relationships" xmlns:p="http://schemas.openxmlformats.org/presentationml/2006/main">
+  <p:cSld>
+    <p:spTree>
+      <p:nvGrpSpPr>
+        <p:cNvPr id="1" name=""/>
+        <p:cNvGrpSpPr/>
+        <p:nvPr/>
+      </p:nvGrpSpPr>
+      <p:grpSpPr>
+        <a:xfrm>
+          <a:off x="0" y="0"/>
+          <a:ext cx="0" cy="0"/>
+          <a:chOff x="0" y="0"/>
+          <a:chExt cx="0" cy="0"/>
+        </a:xfrm>
+      </p:grpSpPr>
+      <p:sp>
+        <p:nvSpPr>
+          <p:cNvPr id="2" name="Title 1"/>
+          <p:cNvSpPr>
+            <a:spLocks noGrp="1"/>
+          </p:cNvSpPr>
+          <p:nvPr>
+            <p:ph type="title"/>
+          </p:nvPr>
+        </p:nvSpPr>
+        <p:spPr/>
+        <p:txBody>
+          <a:bodyPr/>
+          <a:lstStyle/>
+          <a:p>
+            <a:r>
+              <a:rPr lang="en-US" dirty="0"/>
+              <a:t>Highlight Points:: Highlight </a:t>
+            </a:r>
+            <a:r>
+              <a:rPr lang="en-US" dirty="0" smtClean="0"/>
+              <a:t>Points </a:t>
+            </a:r>
+            <a:r>
+              <a:rPr lang="en-US" dirty="0" smtClean="0"/>
+              <a:t>– Select </a:t>
+            </a:r>
+            <a:r>
+              <a:rPr lang="en-US" dirty="0" smtClean="0"/>
+              <a:t>End of Text</a:t>
+            </a:r>
+            <a:endParaRPr lang="en-SG" dirty="0"/>
+          </a:p>
+        </p:txBody>
+      </p:sp>
+      <p:sp>
+        <p:nvSpPr>
+          <p:cNvPr id="4" name="Content Placeholder 2"/>
+          <p:cNvSpPr>
+            <a:spLocks noGrp="1"/>
+          </p:cNvSpPr>
+          <p:nvPr>
+            <p:ph idx="1"/>
+          </p:nvPr>
+        </p:nvSpPr>
+        <p:spPr>
+          <a:xfrm>
+            <a:off x="457200" y="3124200"/>
+            <a:ext cx="8229600" cy="3001963"/>
+          </a:xfrm>
+        </p:spPr>
+        <p:txBody>
+          <a:bodyPr/>
+          <a:lstStyle/>
+          <a:p>
+            <a:r>
+              <a:rPr lang="en-US" dirty="0" smtClean="0"/>
+              <a:t>Move the cursor to the end of </a:t>
+            </a:r>
+            <a:r>
+              <a:rPr lang="en-US" dirty="0" smtClean="0"/>
+              <a:t>the </a:t>
+            </a:r>
+            <a:r>
+              <a:rPr lang="en-US" dirty="0" smtClean="0"/>
+              <a:t>text box and click “Highlight </a:t>
+            </a:r>
+            <a:r>
+              <a:rPr lang="en-US" dirty="0" smtClean="0"/>
+              <a:t>Points”</a:t>
+            </a:r>
+            <a:endParaRPr lang="en-SG" dirty="0"/>
+          </a:p>
+        </p:txBody>
+      </p:sp>
+    </p:spTree>
+    <p:extLst>
+      <p:ext uri="{BB962C8B-B14F-4D97-AF65-F5344CB8AC3E}">
+        <p14:creationId xmlns:p14="http://schemas.microsoft.com/office/powerpoint/2010/main" val="1166666162"/>
+      </p:ext>
+    </p:extLst>
+  </p:cSld>
+  <p:clrMapOvr>
+    <a:masterClrMapping/>
+  </p:clrMapOvr>
+  <p:timing>
+    <p:tnLst>
+      <p:par>
+        <p:cTn id="1" dur="indefinite" restart="never" nodeType="tmRoot"/>
+      </p:par>
+    </p:tnLst>
+  </p:timing>
+</p:sld>
+</file>
+
+<file path=ppt/slides/slide22.xml><?xml version="1.0" encoding="utf-8"?>
+<p:sld xmlns:a="http://schemas.openxmlformats.org/drawingml/2006/main" xmlns:r="http://schemas.openxmlformats.org/officeDocument/2006/relationships" xmlns:p="http://schemas.openxmlformats.org/presentationml/2006/main">
+  <p:cSld>
+    <p:spTree>
+      <p:nvGrpSpPr>
+        <p:cNvPr id="1" name=""/>
+        <p:cNvGrpSpPr/>
+        <p:nvPr/>
+      </p:nvGrpSpPr>
+      <p:grpSpPr>
+        <a:xfrm>
+          <a:off x="0" y="0"/>
+          <a:ext cx="0" cy="0"/>
+          <a:chOff x="0" y="0"/>
+          <a:chExt cx="0" cy="0"/>
+        </a:xfrm>
+      </p:grpSpPr>
+      <p:sp>
+        <p:nvSpPr>
+          <p:cNvPr id="3" name="Rectangle 4"/>
+          <p:cNvSpPr/>
+          <p:nvPr/>
+        </p:nvSpPr>
+        <p:spPr>
+          <a:xfrm>
+            <a:off x="0" y="2286000"/>
+            <a:ext cx="9144000" cy="2209800"/>
+          </a:xfrm>
+          <a:prstGeom prst="rect">
+            <a:avLst/>
+          </a:prstGeom>
+          <a:solidFill>
+            <a:srgbClr val="002060"/>
+          </a:solidFill>
+        </p:spPr>
+        <p:style>
+          <a:lnRef idx="2">
+            <a:schemeClr val="accent1">
+              <a:shade val="50000"/>
+            </a:schemeClr>
+          </a:lnRef>
+          <a:fillRef idx="1">
+            <a:schemeClr val="accent1"/>
+          </a:fillRef>
+          <a:effectRef idx="0">
+            <a:schemeClr val="accent1"/>
+          </a:effectRef>
+          <a:fontRef idx="minor">
+            <a:schemeClr val="lt1"/>
+          </a:fontRef>
+        </p:style>
+        <p:txBody>
+          <a:bodyPr rtlCol="0" anchor="ctr"/>
+          <a:lstStyle/>
+          <a:p>
+            <a:pPr algn="ctr"/>
+            <a:endParaRPr lang="en-US"/>
+          </a:p>
+        </p:txBody>
+      </p:sp>
+      <p:sp>
+        <p:nvSpPr>
+          <p:cNvPr id="2" name="First Textbox"/>
+          <p:cNvSpPr txBox="1"/>
+          <p:nvPr/>
+        </p:nvSpPr>
+        <p:spPr>
+          <a:xfrm>
+            <a:off x="762000" y="533400"/>
+            <a:ext cx="7620000" cy="5909310"/>
+          </a:xfrm>
+          <a:prstGeom prst="rect">
+            <a:avLst/>
+          </a:prstGeom>
+          <a:noFill/>
+        </p:spPr>
+        <p:txBody>
+          <a:bodyPr wrap="square" rtlCol="0">
+            <a:spAutoFit/>
+          </a:bodyPr>
+          <a:lstStyle/>
+          <a:p>
+            <a:pPr marL="285750" indent="-285750">
+              <a:buFont typeface="Arial" panose="020B0604020202020204" pitchFamily="34" charset="0"/>
+              <a:buChar char="•"/>
+            </a:pPr>
+            <a:r>
+              <a:rPr lang="en-US" sz="2800" dirty="0" smtClean="0"/>
+              <a:t>Test - Non-ABC: 1234567890!@#$%^&amp;*()</a:t>
+            </a:r>
+          </a:p>
+          <a:p>
+            <a:r>
+              <a:rPr lang="en-US" sz="2800" dirty="0"/>
+              <a:t>Test </a:t>
+            </a:r>
+            <a:r>
+              <a:rPr lang="en-US" sz="2800" dirty="0" smtClean="0"/>
+              <a:t>– No bullet point</a:t>
+            </a:r>
+            <a:endParaRPr lang="en-US" sz="2800" dirty="0"/>
+          </a:p>
+          <a:p>
+            <a:pPr marL="514350" indent="-514350">
+              <a:buFont typeface="+mj-lt"/>
+              <a:buAutoNum type="arabicPeriod"/>
+            </a:pPr>
+            <a:r>
+              <a:rPr lang="en-US" sz="2800" dirty="0"/>
+              <a:t>Test – </a:t>
+            </a:r>
+            <a:r>
+              <a:rPr lang="en-US" sz="2800" dirty="0" smtClean="0"/>
+              <a:t>Different bullet point</a:t>
+            </a:r>
+          </a:p>
+          <a:p>
+            <a:pPr marL="285750" indent="-285750">
+              <a:buFont typeface="Arial" panose="020B0604020202020204" pitchFamily="34" charset="0"/>
+              <a:buChar char="•"/>
+            </a:pPr>
+            <a:r>
+              <a:rPr lang="en-US" sz="2800" dirty="0" smtClean="0">
+                <a:latin typeface="Times New Roman" panose="02020603050405020304" pitchFamily="18" charset="0"/>
+                <a:cs typeface="Times New Roman" panose="02020603050405020304" pitchFamily="18" charset="0"/>
+              </a:rPr>
+              <a:t>Test - Another Font Family, using Times New Roman</a:t>
+            </a:r>
+          </a:p>
+          <a:p>
+            <a:pPr marL="285750" indent="-285750">
+              <a:buFont typeface="Arial" panose="020B0604020202020204" pitchFamily="34" charset="0"/>
+              <a:buChar char="•"/>
+            </a:pPr>
+            <a:r>
+              <a:rPr lang="en-US" sz="1000" dirty="0" smtClean="0"/>
+              <a:t>Test - very small content. Test: very small content. Test: very small content. Test: very small content</a:t>
+            </a:r>
+          </a:p>
+          <a:p>
+            <a:pPr marL="285750" indent="-285750">
+              <a:buFont typeface="Arial" panose="020B0604020202020204" pitchFamily="34" charset="0"/>
+              <a:buChar char="•"/>
+            </a:pPr>
+            <a:r>
+              <a:rPr lang="en-US" sz="6600" dirty="0" smtClean="0">
+                <a:latin typeface="Arial Black" panose="020B0A04020102020204" pitchFamily="34" charset="0"/>
+              </a:rPr>
+              <a:t>Test - very big</a:t>
+            </a:r>
+          </a:p>
+          <a:p>
+            <a:pPr marL="285750" indent="-285750">
+              <a:buFont typeface="Arial" panose="020B0604020202020204" pitchFamily="34" charset="0"/>
+              <a:buChar char="•"/>
+            </a:pPr>
+            <a:r>
+              <a:rPr lang="en-US" sz="3600" dirty="0" smtClean="0"/>
+              <a:t>Test – Long sentence: </a:t>
+            </a:r>
+            <a:r>
+              <a:rPr lang="en-US" sz="3600" dirty="0" err="1" smtClean="0"/>
+              <a:t>Asdddd</a:t>
+            </a:r>
+            <a:r>
+              <a:rPr lang="en-US" sz="3600" dirty="0" smtClean="0"/>
+              <a:t> </a:t>
+            </a:r>
+            <a:r>
+              <a:rPr lang="en-US" sz="3600" dirty="0" err="1" smtClean="0"/>
+              <a:t>ddd</a:t>
+            </a:r>
+            <a:r>
+              <a:rPr lang="en-US" sz="3600" dirty="0" smtClean="0"/>
+              <a:t> </a:t>
+            </a:r>
+            <a:r>
+              <a:rPr lang="en-US" sz="3600" dirty="0" err="1" smtClean="0"/>
+              <a:t>dd</a:t>
+            </a:r>
+            <a:r>
+              <a:rPr lang="en-US" sz="3600" dirty="0" smtClean="0"/>
+              <a:t> d </a:t>
+            </a:r>
+            <a:r>
+              <a:rPr lang="en-US" sz="3600" dirty="0" err="1" smtClean="0"/>
+              <a:t>ddddd</a:t>
+            </a:r>
+            <a:r>
+              <a:rPr lang="en-US" sz="3600" dirty="0" smtClean="0"/>
+              <a:t> </a:t>
+            </a:r>
+            <a:r>
+              <a:rPr lang="en-US" sz="3600" dirty="0" err="1" smtClean="0"/>
+              <a:t>ddd</a:t>
+            </a:r>
+            <a:r>
+              <a:rPr lang="en-US" sz="3600" dirty="0" smtClean="0"/>
+              <a:t> </a:t>
+            </a:r>
+            <a:r>
+              <a:rPr lang="en-US" sz="3600" dirty="0" err="1" smtClean="0"/>
+              <a:t>ddd</a:t>
+            </a:r>
+            <a:r>
+              <a:rPr lang="en-US" sz="3600" dirty="0" smtClean="0"/>
+              <a:t> </a:t>
+            </a:r>
+            <a:r>
+              <a:rPr lang="en-US" sz="3600" dirty="0" err="1" smtClean="0"/>
+              <a:t>ddd</a:t>
+            </a:r>
+            <a:r>
+              <a:rPr lang="en-US" sz="3600" dirty="0" smtClean="0"/>
+              <a:t> </a:t>
+            </a:r>
+            <a:r>
+              <a:rPr lang="en-US" sz="3600" dirty="0" err="1" smtClean="0"/>
+              <a:t>ddd</a:t>
+            </a:r>
+            <a:r>
+              <a:rPr lang="en-US" sz="3600" dirty="0" smtClean="0"/>
+              <a:t> </a:t>
+            </a:r>
+            <a:r>
+              <a:rPr lang="en-US" sz="3600" dirty="0" err="1" smtClean="0"/>
+              <a:t>ddd</a:t>
+            </a:r>
+            <a:r>
+              <a:rPr lang="en-US" sz="3600" dirty="0" smtClean="0"/>
+              <a:t> </a:t>
+            </a:r>
+            <a:r>
+              <a:rPr lang="en-US" sz="3600" dirty="0" err="1" smtClean="0"/>
+              <a:t>ddd</a:t>
+            </a:r>
+            <a:r>
+              <a:rPr lang="en-US" sz="3600" dirty="0" smtClean="0"/>
+              <a:t> </a:t>
+            </a:r>
+            <a:r>
+              <a:rPr lang="en-US" sz="3600" dirty="0" err="1" smtClean="0"/>
+              <a:t>ddd</a:t>
+            </a:r>
+            <a:r>
+              <a:rPr lang="en-US" sz="3600" dirty="0" smtClean="0"/>
+              <a:t> </a:t>
+            </a:r>
+            <a:r>
+              <a:rPr lang="en-US" sz="3600" dirty="0" err="1" smtClean="0"/>
+              <a:t>dddddd</a:t>
+            </a:r>
+            <a:r>
+              <a:rPr lang="en-US" sz="3600" dirty="0" smtClean="0"/>
+              <a:t> </a:t>
+            </a:r>
+            <a:r>
+              <a:rPr lang="en-US" sz="3600" dirty="0" err="1" smtClean="0"/>
+              <a:t>dd</a:t>
+            </a:r>
+            <a:r>
+              <a:rPr lang="en-US" sz="3600" dirty="0" smtClean="0"/>
+              <a:t> </a:t>
+            </a:r>
+            <a:r>
+              <a:rPr lang="en-US" sz="3600" dirty="0" err="1" smtClean="0"/>
+              <a:t>ddd</a:t>
+            </a:r>
+            <a:r>
+              <a:rPr lang="en-US" sz="3600" dirty="0" smtClean="0"/>
+              <a:t> </a:t>
+            </a:r>
+            <a:r>
+              <a:rPr lang="en-US" sz="3600" dirty="0" err="1" smtClean="0"/>
+              <a:t>ddddd</a:t>
+            </a:r>
+            <a:r>
+              <a:rPr lang="en-US" sz="3600" dirty="0" smtClean="0"/>
+              <a:t> </a:t>
+            </a:r>
+            <a:r>
+              <a:rPr lang="en-US" sz="3600" dirty="0" err="1" smtClean="0"/>
+              <a:t>dd</a:t>
+            </a:r>
+            <a:r>
+              <a:rPr lang="en-US" sz="3600" dirty="0" smtClean="0"/>
+              <a:t> </a:t>
+            </a:r>
+            <a:r>
+              <a:rPr lang="en-US" sz="3600" dirty="0" err="1" smtClean="0"/>
+              <a:t>dd</a:t>
+            </a:r>
+            <a:r>
+              <a:rPr lang="en-US" sz="3600" dirty="0" smtClean="0"/>
+              <a:t> d </a:t>
+            </a:r>
+            <a:r>
+              <a:rPr lang="en-US" sz="3600" dirty="0" err="1" smtClean="0"/>
+              <a:t>ddd</a:t>
+            </a:r>
+            <a:r>
+              <a:rPr lang="en-US" sz="3600" dirty="0" smtClean="0"/>
+              <a:t> </a:t>
+            </a:r>
+            <a:r>
+              <a:rPr lang="en-US" sz="3600" dirty="0" err="1" smtClean="0"/>
+              <a:t>ddd</a:t>
+            </a:r>
+            <a:endParaRPr lang="en-US" sz="3600" dirty="0" smtClean="0"/>
+          </a:p>
+          <a:p>
+            <a:pPr marL="285750" indent="-285750">
+              <a:buFont typeface="Arial" panose="020B0604020202020204" pitchFamily="34" charset="0"/>
+              <a:buChar char="•"/>
+            </a:pPr>
+            <a:r>
+              <a:rPr lang="en-US" altLang="zh-CN" dirty="0" smtClean="0"/>
+              <a:t>Test – Chinese Characters: </a:t>
+            </a:r>
+            <a:r>
+              <a:rPr lang="zh-CN" altLang="en-US" dirty="0" smtClean="0"/>
+              <a:t>阿</a:t>
+            </a:r>
+            <a:r>
+              <a:rPr lang="zh-CN" altLang="en-US" dirty="0"/>
+              <a:t>斯</a:t>
+            </a:r>
+            <a:r>
+              <a:rPr lang="zh-CN" altLang="en-US" dirty="0" smtClean="0"/>
+              <a:t>顿啊盛大速度啊盛大速度啊盛大速度</a:t>
+            </a:r>
+            <a:endParaRPr lang="en-SG" dirty="0"/>
+          </a:p>
+        </p:txBody>
+      </p:sp>
+    </p:spTree>
+    <p:extLst>
+      <p:ext uri="{BB962C8B-B14F-4D97-AF65-F5344CB8AC3E}">
+        <p14:creationId xmlns:p14="http://schemas.microsoft.com/office/powerpoint/2010/main" val="2096991230"/>
+      </p:ext>
+    </p:extLst>
+  </p:cSld>
+  <p:clrMapOvr>
+    <a:masterClrMapping/>
+  </p:clrMapOvr>
+  <p:transition spd="slow">
+    <p:push dir="u"/>
+  </p:transition>
+  <p:timing>
+    <p:tnLst>
+      <p:par>
+        <p:cTn id="1" dur="indefinite" restart="never" nodeType="tmRoot"/>
+      </p:par>
+    </p:tnLst>
+  </p:timing>
+</p:sld>
+</file>
+
+<file path=ppt/slides/slide23.xml><?xml version="1.0" encoding="utf-8"?>
+<p:sld xmlns:a="http://schemas.openxmlformats.org/drawingml/2006/main" xmlns:r="http://schemas.openxmlformats.org/officeDocument/2006/relationships" xmlns:p="http://schemas.openxmlformats.org/presentationml/2006/main">
+  <p:cSld name="PPTLabsHighlightBulletsSlide201702070026288891">
+    <p:spTree>
+      <p:nvGrpSpPr>
+        <p:cNvPr id="1" name=""/>
+        <p:cNvGrpSpPr/>
+        <p:nvPr/>
+      </p:nvGrpSpPr>
+      <p:grpSpPr>
+        <a:xfrm>
+          <a:off x="0" y="0"/>
+          <a:ext cx="0" cy="0"/>
+          <a:chOff x="0" y="0"/>
+          <a:chExt cx="0" cy="0"/>
+        </a:xfrm>
+      </p:grpSpPr>
+      <p:sp>
+        <p:nvSpPr>
+          <p:cNvPr id="3" name="Rectangle 4"/>
+          <p:cNvSpPr/>
+          <p:nvPr/>
+        </p:nvSpPr>
+        <p:spPr>
+          <a:xfrm>
+            <a:off x="0" y="2286000"/>
+            <a:ext cx="9144000" cy="2209800"/>
+          </a:xfrm>
+          <a:prstGeom prst="rect">
+            <a:avLst/>
+          </a:prstGeom>
+          <a:solidFill>
+            <a:srgbClr val="002060"/>
+          </a:solidFill>
+        </p:spPr>
+        <p:style>
+          <a:lnRef idx="2">
+            <a:schemeClr val="accent1">
+              <a:shade val="50000"/>
+            </a:schemeClr>
+          </a:lnRef>
+          <a:fillRef idx="1">
+            <a:schemeClr val="accent1"/>
+          </a:fillRef>
+          <a:effectRef idx="0">
+            <a:schemeClr val="accent1"/>
+          </a:effectRef>
+          <a:fontRef idx="minor">
+            <a:schemeClr val="lt1"/>
+          </a:fontRef>
+        </p:style>
+        <p:txBody>
+          <a:bodyPr rtlCol="0" anchor="ctr"/>
+          <a:lstStyle/>
+          <a:p>
+            <a:pPr algn="ctr"/>
+            <a:endParaRPr lang="en-US"/>
+          </a:p>
+        </p:txBody>
+      </p:sp>
+      <p:sp>
+        <p:nvSpPr>
+          <p:cNvPr id="2" name="HighlightTextShape201702070026289237"/>
+          <p:cNvSpPr txBox="1"/>
+          <p:nvPr/>
+        </p:nvSpPr>
+        <p:spPr>
+          <a:xfrm>
+            <a:off x="762000" y="533400"/>
+            <a:ext cx="7620000" cy="5909310"/>
+          </a:xfrm>
+          <a:prstGeom prst="rect">
+            <a:avLst/>
+          </a:prstGeom>
+          <a:noFill/>
+        </p:spPr>
+        <p:txBody>
+          <a:bodyPr wrap="square" rtlCol="0">
+            <a:spAutoFit/>
+          </a:bodyPr>
+          <a:lstStyle/>
+          <a:p>
+            <a:pPr marL="285750" indent="-285750">
+              <a:buFont typeface="Arial" panose="020B0604020202020204" pitchFamily="34" charset="0"/>
+              <a:buChar char="•"/>
+            </a:pPr>
+            <a:r>
+              <a:rPr lang="en-US" sz="2800" dirty="0" smtClean="0"/>
+              <a:t>Test - Non-ABC: 1234567890!@#$%^&amp;*()</a:t>
+            </a:r>
+          </a:p>
+          <a:p>
+            <a:r>
+              <a:rPr lang="en-US" sz="2800" dirty="0"/>
+              <a:t>Test </a:t>
+            </a:r>
+            <a:r>
+              <a:rPr lang="en-US" sz="2800" dirty="0" smtClean="0"/>
+              <a:t>– No bullet point</a:t>
+            </a:r>
+            <a:endParaRPr lang="en-US" sz="2800" dirty="0"/>
+          </a:p>
+          <a:p>
+            <a:pPr marL="514350" indent="-514350">
+              <a:buFont typeface="+mj-lt"/>
+              <a:buAutoNum type="arabicPeriod"/>
+            </a:pPr>
+            <a:r>
+              <a:rPr lang="en-US" sz="2800" dirty="0"/>
+              <a:t>Test – </a:t>
+            </a:r>
+            <a:r>
+              <a:rPr lang="en-US" sz="2800" dirty="0" smtClean="0"/>
+              <a:t>Different bullet point</a:t>
+            </a:r>
+          </a:p>
+          <a:p>
+            <a:pPr marL="285750" indent="-285750">
+              <a:buFont typeface="Arial" panose="020B0604020202020204" pitchFamily="34" charset="0"/>
+              <a:buChar char="•"/>
+            </a:pPr>
+            <a:r>
+              <a:rPr lang="en-US" sz="2800" dirty="0" smtClean="0">
+                <a:latin typeface="Times New Roman" panose="02020603050405020304" pitchFamily="18" charset="0"/>
+                <a:cs typeface="Times New Roman" panose="02020603050405020304" pitchFamily="18" charset="0"/>
+              </a:rPr>
+              <a:t>Test - Another Font Family, using Times New Roman</a:t>
+            </a:r>
+          </a:p>
+          <a:p>
+            <a:pPr marL="285750" indent="-285750">
+              <a:buFont typeface="Arial" panose="020B0604020202020204" pitchFamily="34" charset="0"/>
+              <a:buChar char="•"/>
+            </a:pPr>
+            <a:r>
+              <a:rPr lang="en-US" sz="1000" dirty="0" smtClean="0"/>
+              <a:t>Test - very small content. Test: very small content. Test: very small content. Test: very small content</a:t>
+            </a:r>
+          </a:p>
+          <a:p>
+            <a:pPr marL="285750" indent="-285750">
+              <a:buFont typeface="Arial" panose="020B0604020202020204" pitchFamily="34" charset="0"/>
+              <a:buChar char="•"/>
+            </a:pPr>
+            <a:r>
+              <a:rPr lang="en-US" sz="6600" dirty="0" smtClean="0">
+                <a:latin typeface="Arial Black" panose="020B0A04020102020204" pitchFamily="34" charset="0"/>
+              </a:rPr>
+              <a:t>Test - very big</a:t>
+            </a:r>
+          </a:p>
+          <a:p>
+            <a:pPr marL="285750" indent="-285750">
+              <a:buFont typeface="Arial" panose="020B0604020202020204" pitchFamily="34" charset="0"/>
+              <a:buChar char="•"/>
+            </a:pPr>
+            <a:r>
+              <a:rPr lang="en-US" sz="3600" dirty="0" smtClean="0"/>
+              <a:t>Test – Long sentence: </a:t>
+            </a:r>
+            <a:r>
+              <a:rPr lang="en-US" sz="3600" dirty="0" err="1" smtClean="0"/>
+              <a:t>Asdddd</a:t>
+            </a:r>
+            <a:r>
+              <a:rPr lang="en-US" sz="3600" dirty="0" smtClean="0"/>
+              <a:t> </a:t>
+            </a:r>
+            <a:r>
+              <a:rPr lang="en-US" sz="3600" dirty="0" err="1" smtClean="0"/>
+              <a:t>ddd</a:t>
+            </a:r>
+            <a:r>
+              <a:rPr lang="en-US" sz="3600" dirty="0" smtClean="0"/>
+              <a:t> </a:t>
+            </a:r>
+            <a:r>
+              <a:rPr lang="en-US" sz="3600" dirty="0" err="1" smtClean="0"/>
+              <a:t>dd</a:t>
+            </a:r>
+            <a:r>
+              <a:rPr lang="en-US" sz="3600" dirty="0" smtClean="0"/>
+              <a:t> d </a:t>
+            </a:r>
+            <a:r>
+              <a:rPr lang="en-US" sz="3600" dirty="0" err="1" smtClean="0"/>
+              <a:t>ddddd</a:t>
+            </a:r>
+            <a:r>
+              <a:rPr lang="en-US" sz="3600" dirty="0" smtClean="0"/>
+              <a:t> </a:t>
+            </a:r>
+            <a:r>
+              <a:rPr lang="en-US" sz="3600" dirty="0" err="1" smtClean="0"/>
+              <a:t>ddd</a:t>
+            </a:r>
+            <a:r>
+              <a:rPr lang="en-US" sz="3600" dirty="0" smtClean="0"/>
+              <a:t> </a:t>
+            </a:r>
+            <a:r>
+              <a:rPr lang="en-US" sz="3600" dirty="0" err="1" smtClean="0"/>
+              <a:t>ddd</a:t>
+            </a:r>
+            <a:r>
+              <a:rPr lang="en-US" sz="3600" dirty="0" smtClean="0"/>
+              <a:t> </a:t>
+            </a:r>
+            <a:r>
+              <a:rPr lang="en-US" sz="3600" dirty="0" err="1" smtClean="0"/>
+              <a:t>ddd</a:t>
+            </a:r>
+            <a:r>
+              <a:rPr lang="en-US" sz="3600" dirty="0" smtClean="0"/>
+              <a:t> </a:t>
+            </a:r>
+            <a:r>
+              <a:rPr lang="en-US" sz="3600" dirty="0" err="1" smtClean="0"/>
+              <a:t>ddd</a:t>
+            </a:r>
+            <a:r>
+              <a:rPr lang="en-US" sz="3600" dirty="0" smtClean="0"/>
+              <a:t> </a:t>
+            </a:r>
+            <a:r>
+              <a:rPr lang="en-US" sz="3600" dirty="0" err="1" smtClean="0"/>
+              <a:t>ddd</a:t>
+            </a:r>
+            <a:r>
+              <a:rPr lang="en-US" sz="3600" dirty="0" smtClean="0"/>
+              <a:t> </a:t>
+            </a:r>
+            <a:r>
+              <a:rPr lang="en-US" sz="3600" dirty="0" err="1" smtClean="0"/>
+              <a:t>ddd</a:t>
+            </a:r>
+            <a:r>
+              <a:rPr lang="en-US" sz="3600" dirty="0" smtClean="0"/>
+              <a:t> </a:t>
+            </a:r>
+            <a:r>
+              <a:rPr lang="en-US" sz="3600" dirty="0" err="1" smtClean="0"/>
+              <a:t>ddd</a:t>
+            </a:r>
+            <a:r>
+              <a:rPr lang="en-US" sz="3600" dirty="0" smtClean="0"/>
+              <a:t> </a:t>
+            </a:r>
+            <a:r>
+              <a:rPr lang="en-US" sz="3600" dirty="0" err="1" smtClean="0"/>
+              <a:t>dddddd</a:t>
+            </a:r>
+            <a:r>
+              <a:rPr lang="en-US" sz="3600" dirty="0" smtClean="0"/>
+              <a:t> </a:t>
+            </a:r>
+            <a:r>
+              <a:rPr lang="en-US" sz="3600" dirty="0" err="1" smtClean="0"/>
+              <a:t>dd</a:t>
+            </a:r>
+            <a:r>
+              <a:rPr lang="en-US" sz="3600" dirty="0" smtClean="0"/>
+              <a:t> </a:t>
+            </a:r>
+            <a:r>
+              <a:rPr lang="en-US" sz="3600" dirty="0" err="1" smtClean="0"/>
+              <a:t>ddd</a:t>
+            </a:r>
+            <a:r>
+              <a:rPr lang="en-US" sz="3600" dirty="0" smtClean="0"/>
+              <a:t> </a:t>
+            </a:r>
+            <a:r>
+              <a:rPr lang="en-US" sz="3600" dirty="0" err="1" smtClean="0"/>
+              <a:t>ddddd</a:t>
+            </a:r>
+            <a:r>
+              <a:rPr lang="en-US" sz="3600" dirty="0" smtClean="0"/>
+              <a:t> </a:t>
+            </a:r>
+            <a:r>
+              <a:rPr lang="en-US" sz="3600" dirty="0" err="1" smtClean="0"/>
+              <a:t>dd</a:t>
+            </a:r>
+            <a:r>
+              <a:rPr lang="en-US" sz="3600" dirty="0" smtClean="0"/>
+              <a:t> </a:t>
+            </a:r>
+            <a:r>
+              <a:rPr lang="en-US" sz="3600" dirty="0" err="1" smtClean="0"/>
+              <a:t>dd</a:t>
+            </a:r>
+            <a:r>
+              <a:rPr lang="en-US" sz="3600" dirty="0" smtClean="0"/>
+              <a:t> d </a:t>
+            </a:r>
+            <a:r>
+              <a:rPr lang="en-US" sz="3600" dirty="0" err="1" smtClean="0"/>
+              <a:t>ddd</a:t>
+            </a:r>
+            <a:r>
+              <a:rPr lang="en-US" sz="3600" dirty="0" smtClean="0"/>
+              <a:t> </a:t>
+            </a:r>
+            <a:r>
+              <a:rPr lang="en-US" sz="3600" dirty="0" err="1" smtClean="0"/>
+              <a:t>ddd</a:t>
+            </a:r>
+            <a:endParaRPr lang="en-US" sz="3600" dirty="0" smtClean="0"/>
+          </a:p>
+          <a:p>
+            <a:pPr marL="285750" indent="-285750">
+              <a:buFont typeface="Arial" panose="020B0604020202020204" pitchFamily="34" charset="0"/>
+              <a:buChar char="•"/>
+            </a:pPr>
+            <a:r>
+              <a:rPr lang="en-US" altLang="zh-CN" dirty="0" smtClean="0"/>
+              <a:t>Test – Chinese Characters: </a:t>
+            </a:r>
+            <a:r>
+              <a:rPr lang="zh-CN" altLang="en-US" dirty="0" smtClean="0"/>
+              <a:t>阿</a:t>
+            </a:r>
+            <a:r>
+              <a:rPr lang="zh-CN" altLang="en-US" dirty="0"/>
+              <a:t>斯</a:t>
+            </a:r>
+            <a:r>
+              <a:rPr lang="zh-CN" altLang="en-US" dirty="0" smtClean="0"/>
+              <a:t>顿啊盛大速度啊盛大速度啊盛大速度</a:t>
+            </a:r>
+            <a:endParaRPr lang="en-SG" dirty="0"/>
+          </a:p>
+        </p:txBody>
+      </p:sp>
+    </p:spTree>
+    <p:extLst>
+      <p:ext uri="{BB962C8B-B14F-4D97-AF65-F5344CB8AC3E}">
+        <p14:creationId xmlns:p14="http://schemas.microsoft.com/office/powerpoint/2010/main" val="2521869913"/>
+      </p:ext>
+    </p:extLst>
+  </p:cSld>
+  <p:clrMapOvr>
+    <a:masterClrMapping/>
+  </p:clrMapOvr>
+  <p:transition spd="slow">
+    <p:push dir="u"/>
+  </p:transition>
+  <p:timing>
+    <p:tnLst>
+      <p:par>
+        <p:cTn id="1" dur="indefinite" restart="never" nodeType="tmRoot">
+          <p:childTnLst>
+            <p:seq concurrent="1" nextAc="seek">
+              <p:cTn id="2" dur="indefinite" nodeType="mainSeq">
+                <p:childTnLst>
+                  <p:par>
+                    <p:cTn id="3" fill="hold">
+                      <p:stCondLst>
+                        <p:cond delay="indefinite"/>
+                      </p:stCondLst>
+                      <p:childTnLst>
+                        <p:par>
+                          <p:cTn id="4" fill="hold">
+                            <p:stCondLst>
+                              <p:cond delay="0"/>
+                            </p:stCondLst>
+                            <p:childTnLst>
+                              <p:par>
+                                <p:cTn id="5" presetID="3" presetClass="emph" presetSubtype="2" fill="hold" grpId="0" nodeType="clickEffect">
+                                  <p:stCondLst>
+                                    <p:cond delay="100"/>
+                                  </p:stCondLst>
+                                  <p:childTnLst>
+                                    <p:animClr clrSpc="rgb" dir="cw">
+                                      <p:cBhvr override="childStyle">
+                                        <p:cTn id="6" dur="100" fill="hold"/>
+                                        <p:tgtEl>
+                                          <p:spTgt spid="2">
+                                            <p:txEl>
+                                              <p:pRg st="7" end="7"/>
+                                            </p:txEl>
+                                          </p:spTgt>
+                                        </p:tgtEl>
+                                        <p:attrNameLst>
+                                          <p:attrName>style.color</p:attrName>
+                                        </p:attrNameLst>
+                                      </p:cBhvr>
+                                      <p:to>
+                                        <a:srgbClr val="F2290A"/>
+                                      </p:to>
+                                    </p:animClr>
+                                  </p:childTnLst>
+                                </p:cTn>
+                              </p:par>
+                            </p:childTnLst>
+                          </p:cTn>
+                        </p:par>
+                      </p:childTnLst>
+                    </p:cTn>
+                  </p:par>
+                  <p:par>
+                    <p:cTn id="7" fill="hold">
+                      <p:stCondLst>
+                        <p:cond delay="indefinite"/>
+                      </p:stCondLst>
+                      <p:childTnLst>
+                        <p:par>
+                          <p:cTn id="8" fill="hold">
+                            <p:stCondLst>
+                              <p:cond delay="0"/>
+                            </p:stCondLst>
+                            <p:childTnLst>
+                              <p:par>
+                                <p:cTn id="9" presetID="3" presetClass="emph" presetSubtype="2" fill="hold" grpId="1" nodeType="clickEffect">
+                                  <p:stCondLst>
+                                    <p:cond delay="100"/>
+                                  </p:stCondLst>
+                                  <p:childTnLst>
+                                    <p:animClr clrSpc="rgb" dir="cw">
+                                      <p:cBhvr override="childStyle">
+                                        <p:cTn id="10" dur="100" fill="hold"/>
+                                        <p:tgtEl>
+                                          <p:spTgt spid="2">
+                                            <p:txEl>
+                                              <p:pRg st="7" end="7"/>
+                                            </p:txEl>
+                                          </p:spTgt>
+                                        </p:tgtEl>
+                                        <p:attrNameLst>
+                                          <p:attrName>style.color</p:attrName>
+                                        </p:attrNameLst>
+                                      </p:cBhvr>
+                                      <p:to>
+                                        <a:srgbClr val="000000"/>
+                                      </p:to>
+                                    </p:animClr>
+                                  </p:childTnLst>
+                                </p:cTn>
+                              </p:par>
+                            </p:childTnLst>
+                          </p:cTn>
+                        </p:par>
+                      </p:childTnLst>
+                    </p:cTn>
+                  </p:par>
+                </p:childTnLst>
+              </p:cTn>
+              <p:prevCondLst>
+                <p:cond evt="onPrev" delay="0">
+                  <p:tgtEl>
+                    <p:sldTgt/>
+                  </p:tgtEl>
+                </p:cond>
+              </p:prevCondLst>
+              <p:nextCondLst>
+                <p:cond evt="onNext" delay="0">
+                  <p:tgtEl>
+                    <p:sldTgt/>
+                  </p:tgtEl>
+                </p:cond>
+              </p:nextCondLst>
+            </p:seq>
+          </p:childTnLst>
+        </p:cTn>
+      </p:par>
+    </p:tnLst>
+    <p:bldLst>
+      <p:bldP spid="2" grpId="0" build="p" bldLvl="5"/>
+      <p:bldP spid="2" grpId="1" build="p" bldLvl="5"/>
+    </p:bldLst>
+  </p:timing>
+</p:sld>
+</file>
+
+<file path=ppt/slides/slide24.xml><?xml version="1.0" encoding="utf-8"?>
 <p:sld xmlns:a="http://schemas.openxmlformats.org/drawingml/2006/main" xmlns:r="http://schemas.openxmlformats.org/officeDocument/2006/relationships" xmlns:p="http://schemas.openxmlformats.org/presentationml/2006/main" show="0">
   <p:cSld name="PPTLabsAcknowledgementSlide">
     <p:spTree>
@@ -22742,7 +23693,7 @@
   <a:extraClrSchemeLst/>
   <a:extLst>
     <a:ext uri="{05A4C25C-085E-4340-85A3-A5531E510DB2}">
-      <thm15:themeFamily xmlns:thm15="http://schemas.microsoft.com/office/thememl/2012/main" xmlns="" name="Office Theme" id="{62F939B6-93AF-4DB8-9C6B-D6C7DFDC589F}" vid="{4A3C46E8-61CC-4603-A589-7422A47A8E4A}"/>
+      <thm15:themeFamily xmlns:thm15="http://schemas.microsoft.com/office/thememl/2012/main" name="Office Theme" id="{62F939B6-93AF-4DB8-9C6B-D6C7DFDC589F}" vid="{4A3C46E8-61CC-4603-A589-7422A47A8E4A}"/>
     </a:ext>
   </a:extLst>
 </a:theme>

</xml_diff>

<commit_message>
Highlight Point doesn't work with last bullet #1114 (#1115)
* Fix bug with highlight Points

* Missing [i]

* Changed to 'actualParagraphLength'

* Refactor HasAnimationForClick

* Add test for select end of textbox
</commit_message>
<xml_diff>
--- a/doc/test/HighlightPoints.pptx
+++ b/doc/test/HighlightPoints.pptx
@@ -7,7 +7,7 @@
     <p:sldMasterId id="2147483672" r:id="rId3"/>
   </p:sldMasterIdLst>
   <p:notesMasterIdLst>
-    <p:notesMasterId r:id="rId25"/>
+    <p:notesMasterId r:id="rId28"/>
   </p:notesMasterIdLst>
   <p:sldIdLst>
     <p:sldId id="287" r:id="rId4"/>
@@ -30,7 +30,10 @@
     <p:sldId id="323" r:id="rId21"/>
     <p:sldId id="324" r:id="rId22"/>
     <p:sldId id="329" r:id="rId23"/>
-    <p:sldId id="305" r:id="rId24"/>
+    <p:sldId id="334" r:id="rId24"/>
+    <p:sldId id="333" r:id="rId25"/>
+    <p:sldId id="335" r:id="rId26"/>
+    <p:sldId id="305" r:id="rId27"/>
   </p:sldIdLst>
   <p:sldSz cx="9144000" cy="6858000" type="screen4x3"/>
   <p:notesSz cx="6858000" cy="9144000"/>
@@ -158,13 +161,16 @@
             <p14:sldId id="323"/>
             <p14:sldId id="324"/>
             <p14:sldId id="329"/>
+            <p14:sldId id="334"/>
+            <p14:sldId id="333"/>
+            <p14:sldId id="335"/>
             <p14:sldId id="305"/>
           </p14:sldIdLst>
         </p14:section>
       </p14:sectionLst>
     </p:ext>
     <p:ext uri="{EFAFB233-063F-42B5-8137-9DF3F51BA10A}">
-      <p15:sldGuideLst xmlns:p15="http://schemas.microsoft.com/office/powerpoint/2012/main" xmlns="">
+      <p15:sldGuideLst xmlns:p15="http://schemas.microsoft.com/office/powerpoint/2012/main">
         <p15:guide id="1" orient="horz" pos="2160">
           <p15:clr>
             <a:srgbClr val="A4A3A4"/>
@@ -263,7 +269,7 @@
           <a:p>
             <a:fld id="{7B6B14F6-3F9A-43ED-BCC2-4547CC5017BD}" type="datetimeFigureOut">
               <a:rPr lang="en-SG" smtClean="0"/>
-              <a:t>19/6/2015</a:t>
+              <a:t>2/7/2017</a:t>
             </a:fld>
             <a:endParaRPr lang="en-SG"/>
           </a:p>
@@ -712,7 +718,7 @@
           <a:p>
             <a:fld id="{699DC775-C286-4358-8C92-D7E584E969B3}" type="datetimeFigureOut">
               <a:rPr lang="en-US" smtClean="0"/>
-              <a:t>19-Jun-15</a:t>
+              <a:t>2/7/2017</a:t>
             </a:fld>
             <a:endParaRPr lang="en-US"/>
           </a:p>
@@ -882,7 +888,7 @@
           <a:p>
             <a:fld id="{699DC775-C286-4358-8C92-D7E584E969B3}" type="datetimeFigureOut">
               <a:rPr lang="en-US" smtClean="0"/>
-              <a:t>19-Jun-15</a:t>
+              <a:t>2/7/2017</a:t>
             </a:fld>
             <a:endParaRPr lang="en-US"/>
           </a:p>
@@ -1062,7 +1068,7 @@
           <a:p>
             <a:fld id="{699DC775-C286-4358-8C92-D7E584E969B3}" type="datetimeFigureOut">
               <a:rPr lang="en-US" smtClean="0"/>
-              <a:t>19-Jun-15</a:t>
+              <a:t>2/7/2017</a:t>
             </a:fld>
             <a:endParaRPr lang="en-US"/>
           </a:p>
@@ -1304,7 +1310,7 @@
           <a:p>
             <a:fld id="{699DC775-C286-4358-8C92-D7E584E969B3}" type="datetimeFigureOut">
               <a:rPr lang="en-US" smtClean="0"/>
-              <a:t>19-Jun-15</a:t>
+              <a:t>2/7/2017</a:t>
             </a:fld>
             <a:endParaRPr lang="en-US"/>
           </a:p>
@@ -1474,7 +1480,7 @@
           <a:p>
             <a:fld id="{699DC775-C286-4358-8C92-D7E584E969B3}" type="datetimeFigureOut">
               <a:rPr lang="en-US" smtClean="0"/>
-              <a:t>19-Jun-15</a:t>
+              <a:t>2/7/2017</a:t>
             </a:fld>
             <a:endParaRPr lang="en-US"/>
           </a:p>
@@ -1720,7 +1726,7 @@
           <a:p>
             <a:fld id="{699DC775-C286-4358-8C92-D7E584E969B3}" type="datetimeFigureOut">
               <a:rPr lang="en-US" smtClean="0"/>
-              <a:t>19-Jun-15</a:t>
+              <a:t>2/7/2017</a:t>
             </a:fld>
             <a:endParaRPr lang="en-US"/>
           </a:p>
@@ -2008,7 +2014,7 @@
           <a:p>
             <a:fld id="{699DC775-C286-4358-8C92-D7E584E969B3}" type="datetimeFigureOut">
               <a:rPr lang="en-US" smtClean="0"/>
-              <a:t>19-Jun-15</a:t>
+              <a:t>2/7/2017</a:t>
             </a:fld>
             <a:endParaRPr lang="en-US"/>
           </a:p>
@@ -2430,7 +2436,7 @@
           <a:p>
             <a:fld id="{699DC775-C286-4358-8C92-D7E584E969B3}" type="datetimeFigureOut">
               <a:rPr lang="en-US" smtClean="0"/>
-              <a:t>19-Jun-15</a:t>
+              <a:t>2/7/2017</a:t>
             </a:fld>
             <a:endParaRPr lang="en-US"/>
           </a:p>
@@ -2548,7 +2554,7 @@
           <a:p>
             <a:fld id="{699DC775-C286-4358-8C92-D7E584E969B3}" type="datetimeFigureOut">
               <a:rPr lang="en-US" smtClean="0"/>
-              <a:t>19-Jun-15</a:t>
+              <a:t>2/7/2017</a:t>
             </a:fld>
             <a:endParaRPr lang="en-US"/>
           </a:p>
@@ -2643,7 +2649,7 @@
           <a:p>
             <a:fld id="{699DC775-C286-4358-8C92-D7E584E969B3}" type="datetimeFigureOut">
               <a:rPr lang="en-US" smtClean="0"/>
-              <a:t>19-Jun-15</a:t>
+              <a:t>2/7/2017</a:t>
             </a:fld>
             <a:endParaRPr lang="en-US"/>
           </a:p>
@@ -2920,7 +2926,7 @@
           <a:p>
             <a:fld id="{699DC775-C286-4358-8C92-D7E584E969B3}" type="datetimeFigureOut">
               <a:rPr lang="en-US" smtClean="0"/>
-              <a:t>19-Jun-15</a:t>
+              <a:t>2/7/2017</a:t>
             </a:fld>
             <a:endParaRPr lang="en-US"/>
           </a:p>
@@ -3090,7 +3096,7 @@
           <a:p>
             <a:fld id="{699DC775-C286-4358-8C92-D7E584E969B3}" type="datetimeFigureOut">
               <a:rPr lang="en-US" smtClean="0"/>
-              <a:t>19-Jun-15</a:t>
+              <a:t>2/7/2017</a:t>
             </a:fld>
             <a:endParaRPr lang="en-US"/>
           </a:p>
@@ -3343,7 +3349,7 @@
           <a:p>
             <a:fld id="{699DC775-C286-4358-8C92-D7E584E969B3}" type="datetimeFigureOut">
               <a:rPr lang="en-US" smtClean="0"/>
-              <a:t>19-Jun-15</a:t>
+              <a:t>2/7/2017</a:t>
             </a:fld>
             <a:endParaRPr lang="en-US"/>
           </a:p>
@@ -3513,7 +3519,7 @@
           <a:p>
             <a:fld id="{699DC775-C286-4358-8C92-D7E584E969B3}" type="datetimeFigureOut">
               <a:rPr lang="en-US" smtClean="0"/>
-              <a:t>19-Jun-15</a:t>
+              <a:t>2/7/2017</a:t>
             </a:fld>
             <a:endParaRPr lang="en-US"/>
           </a:p>
@@ -3693,7 +3699,7 @@
           <a:p>
             <a:fld id="{699DC775-C286-4358-8C92-D7E584E969B3}" type="datetimeFigureOut">
               <a:rPr lang="en-US" smtClean="0"/>
-              <a:t>19-Jun-15</a:t>
+              <a:t>2/7/2017</a:t>
             </a:fld>
             <a:endParaRPr lang="en-US"/>
           </a:p>
@@ -3943,7 +3949,7 @@
           <a:p>
             <a:fld id="{699DC775-C286-4358-8C92-D7E584E969B3}" type="datetimeFigureOut">
               <a:rPr lang="en-US" smtClean="0"/>
-              <a:t>19-Jun-15</a:t>
+              <a:t>2/7/2017</a:t>
             </a:fld>
             <a:endParaRPr lang="en-US"/>
           </a:p>
@@ -4121,7 +4127,7 @@
           <a:p>
             <a:fld id="{699DC775-C286-4358-8C92-D7E584E969B3}" type="datetimeFigureOut">
               <a:rPr lang="en-US" smtClean="0"/>
-              <a:t>19-Jun-15</a:t>
+              <a:t>2/7/2017</a:t>
             </a:fld>
             <a:endParaRPr lang="en-US"/>
           </a:p>
@@ -4375,7 +4381,7 @@
           <a:p>
             <a:fld id="{699DC775-C286-4358-8C92-D7E584E969B3}" type="datetimeFigureOut">
               <a:rPr lang="en-US" smtClean="0"/>
-              <a:t>19-Jun-15</a:t>
+              <a:t>2/7/2017</a:t>
             </a:fld>
             <a:endParaRPr lang="en-US"/>
           </a:p>
@@ -4671,7 +4677,7 @@
           <a:p>
             <a:fld id="{699DC775-C286-4358-8C92-D7E584E969B3}" type="datetimeFigureOut">
               <a:rPr lang="en-US" smtClean="0"/>
-              <a:t>19-Jun-15</a:t>
+              <a:t>2/7/2017</a:t>
             </a:fld>
             <a:endParaRPr lang="en-US"/>
           </a:p>
@@ -5101,7 +5107,7 @@
           <a:p>
             <a:fld id="{699DC775-C286-4358-8C92-D7E584E969B3}" type="datetimeFigureOut">
               <a:rPr lang="en-US" smtClean="0"/>
-              <a:t>19-Jun-15</a:t>
+              <a:t>2/7/2017</a:t>
             </a:fld>
             <a:endParaRPr lang="en-US"/>
           </a:p>
@@ -5227,7 +5233,7 @@
           <a:p>
             <a:fld id="{699DC775-C286-4358-8C92-D7E584E969B3}" type="datetimeFigureOut">
               <a:rPr lang="en-US" smtClean="0"/>
-              <a:t>19-Jun-15</a:t>
+              <a:t>2/7/2017</a:t>
             </a:fld>
             <a:endParaRPr lang="en-US"/>
           </a:p>
@@ -5330,7 +5336,7 @@
           <a:p>
             <a:fld id="{699DC775-C286-4358-8C92-D7E584E969B3}" type="datetimeFigureOut">
               <a:rPr lang="en-US" smtClean="0"/>
-              <a:t>19-Jun-15</a:t>
+              <a:t>2/7/2017</a:t>
             </a:fld>
             <a:endParaRPr lang="en-US"/>
           </a:p>
@@ -5576,7 +5582,7 @@
           <a:p>
             <a:fld id="{699DC775-C286-4358-8C92-D7E584E969B3}" type="datetimeFigureOut">
               <a:rPr lang="en-US" smtClean="0"/>
-              <a:t>19-Jun-15</a:t>
+              <a:t>2/7/2017</a:t>
             </a:fld>
             <a:endParaRPr lang="en-US"/>
           </a:p>
@@ -5861,7 +5867,7 @@
           <a:p>
             <a:fld id="{699DC775-C286-4358-8C92-D7E584E969B3}" type="datetimeFigureOut">
               <a:rPr lang="en-US" smtClean="0"/>
-              <a:t>19-Jun-15</a:t>
+              <a:t>2/7/2017</a:t>
             </a:fld>
             <a:endParaRPr lang="en-US"/>
           </a:p>
@@ -6122,7 +6128,7 @@
           <a:p>
             <a:fld id="{699DC775-C286-4358-8C92-D7E584E969B3}" type="datetimeFigureOut">
               <a:rPr lang="en-US" smtClean="0"/>
-              <a:t>19-Jun-15</a:t>
+              <a:t>2/7/2017</a:t>
             </a:fld>
             <a:endParaRPr lang="en-US"/>
           </a:p>
@@ -6300,7 +6306,7 @@
           <a:p>
             <a:fld id="{699DC775-C286-4358-8C92-D7E584E969B3}" type="datetimeFigureOut">
               <a:rPr lang="en-US" smtClean="0"/>
-              <a:t>19-Jun-15</a:t>
+              <a:t>2/7/2017</a:t>
             </a:fld>
             <a:endParaRPr lang="en-US"/>
           </a:p>
@@ -6488,7 +6494,7 @@
           <a:p>
             <a:fld id="{699DC775-C286-4358-8C92-D7E584E969B3}" type="datetimeFigureOut">
               <a:rPr lang="en-US" smtClean="0"/>
-              <a:t>19-Jun-15</a:t>
+              <a:t>2/7/2017</a:t>
             </a:fld>
             <a:endParaRPr lang="en-US"/>
           </a:p>
@@ -6776,7 +6782,7 @@
           <a:p>
             <a:fld id="{699DC775-C286-4358-8C92-D7E584E969B3}" type="datetimeFigureOut">
               <a:rPr lang="en-US" smtClean="0"/>
-              <a:t>19-Jun-15</a:t>
+              <a:t>2/7/2017</a:t>
             </a:fld>
             <a:endParaRPr lang="en-US"/>
           </a:p>
@@ -7198,7 +7204,7 @@
           <a:p>
             <a:fld id="{699DC775-C286-4358-8C92-D7E584E969B3}" type="datetimeFigureOut">
               <a:rPr lang="en-US" smtClean="0"/>
-              <a:t>19-Jun-15</a:t>
+              <a:t>2/7/2017</a:t>
             </a:fld>
             <a:endParaRPr lang="en-US"/>
           </a:p>
@@ -7316,7 +7322,7 @@
           <a:p>
             <a:fld id="{699DC775-C286-4358-8C92-D7E584E969B3}" type="datetimeFigureOut">
               <a:rPr lang="en-US" smtClean="0"/>
-              <a:t>19-Jun-15</a:t>
+              <a:t>2/7/2017</a:t>
             </a:fld>
             <a:endParaRPr lang="en-US"/>
           </a:p>
@@ -7411,7 +7417,7 @@
           <a:p>
             <a:fld id="{699DC775-C286-4358-8C92-D7E584E969B3}" type="datetimeFigureOut">
               <a:rPr lang="en-US" smtClean="0"/>
-              <a:t>19-Jun-15</a:t>
+              <a:t>2/7/2017</a:t>
             </a:fld>
             <a:endParaRPr lang="en-US"/>
           </a:p>
@@ -7688,7 +7694,7 @@
           <a:p>
             <a:fld id="{699DC775-C286-4358-8C92-D7E584E969B3}" type="datetimeFigureOut">
               <a:rPr lang="en-US" smtClean="0"/>
-              <a:t>19-Jun-15</a:t>
+              <a:t>2/7/2017</a:t>
             </a:fld>
             <a:endParaRPr lang="en-US"/>
           </a:p>
@@ -7941,7 +7947,7 @@
           <a:p>
             <a:fld id="{699DC775-C286-4358-8C92-D7E584E969B3}" type="datetimeFigureOut">
               <a:rPr lang="en-US" smtClean="0"/>
-              <a:t>19-Jun-15</a:t>
+              <a:t>2/7/2017</a:t>
             </a:fld>
             <a:endParaRPr lang="en-US"/>
           </a:p>
@@ -8154,7 +8160,7 @@
           <a:p>
             <a:fld id="{699DC775-C286-4358-8C92-D7E584E969B3}" type="datetimeFigureOut">
               <a:rPr lang="en-US" smtClean="0"/>
-              <a:t>19-Jun-15</a:t>
+              <a:t>2/7/2017</a:t>
             </a:fld>
             <a:endParaRPr lang="en-US"/>
           </a:p>
@@ -8669,7 +8675,7 @@
           <a:p>
             <a:fld id="{699DC775-C286-4358-8C92-D7E584E969B3}" type="datetimeFigureOut">
               <a:rPr lang="en-US" smtClean="0"/>
-              <a:t>19-Jun-15</a:t>
+              <a:t>2/7/2017</a:t>
             </a:fld>
             <a:endParaRPr lang="en-US"/>
           </a:p>
@@ -9182,7 +9188,7 @@
           <a:p>
             <a:fld id="{699DC775-C286-4358-8C92-D7E584E969B3}" type="datetimeFigureOut">
               <a:rPr lang="en-US" smtClean="0"/>
-              <a:t>19-Jun-15</a:t>
+              <a:t>2/7/2017</a:t>
             </a:fld>
             <a:endParaRPr lang="en-US"/>
           </a:p>
@@ -18303,6 +18309,951 @@
 </file>
 
 <file path=ppt/slides/slide21.xml><?xml version="1.0" encoding="utf-8"?>
+<p:sld xmlns:a="http://schemas.openxmlformats.org/drawingml/2006/main" xmlns:r="http://schemas.openxmlformats.org/officeDocument/2006/relationships" xmlns:p="http://schemas.openxmlformats.org/presentationml/2006/main">
+  <p:cSld>
+    <p:spTree>
+      <p:nvGrpSpPr>
+        <p:cNvPr id="1" name=""/>
+        <p:cNvGrpSpPr/>
+        <p:nvPr/>
+      </p:nvGrpSpPr>
+      <p:grpSpPr>
+        <a:xfrm>
+          <a:off x="0" y="0"/>
+          <a:ext cx="0" cy="0"/>
+          <a:chOff x="0" y="0"/>
+          <a:chExt cx="0" cy="0"/>
+        </a:xfrm>
+      </p:grpSpPr>
+      <p:sp>
+        <p:nvSpPr>
+          <p:cNvPr id="2" name="Title 1"/>
+          <p:cNvSpPr>
+            <a:spLocks noGrp="1"/>
+          </p:cNvSpPr>
+          <p:nvPr>
+            <p:ph type="title"/>
+          </p:nvPr>
+        </p:nvSpPr>
+        <p:spPr/>
+        <p:txBody>
+          <a:bodyPr/>
+          <a:lstStyle/>
+          <a:p>
+            <a:r>
+              <a:rPr lang="en-US" dirty="0"/>
+              <a:t>Highlight Points:: Highlight </a:t>
+            </a:r>
+            <a:r>
+              <a:rPr lang="en-US" dirty="0" smtClean="0"/>
+              <a:t>Points </a:t>
+            </a:r>
+            <a:r>
+              <a:rPr lang="en-US" dirty="0" smtClean="0"/>
+              <a:t>– Select </a:t>
+            </a:r>
+            <a:r>
+              <a:rPr lang="en-US" dirty="0" smtClean="0"/>
+              <a:t>End of Text</a:t>
+            </a:r>
+            <a:endParaRPr lang="en-SG" dirty="0"/>
+          </a:p>
+        </p:txBody>
+      </p:sp>
+      <p:sp>
+        <p:nvSpPr>
+          <p:cNvPr id="4" name="Content Placeholder 2"/>
+          <p:cNvSpPr>
+            <a:spLocks noGrp="1"/>
+          </p:cNvSpPr>
+          <p:nvPr>
+            <p:ph idx="1"/>
+          </p:nvPr>
+        </p:nvSpPr>
+        <p:spPr>
+          <a:xfrm>
+            <a:off x="457200" y="3124200"/>
+            <a:ext cx="8229600" cy="3001963"/>
+          </a:xfrm>
+        </p:spPr>
+        <p:txBody>
+          <a:bodyPr/>
+          <a:lstStyle/>
+          <a:p>
+            <a:r>
+              <a:rPr lang="en-US" dirty="0" smtClean="0"/>
+              <a:t>Move the cursor to the end of </a:t>
+            </a:r>
+            <a:r>
+              <a:rPr lang="en-US" dirty="0" smtClean="0"/>
+              <a:t>the </a:t>
+            </a:r>
+            <a:r>
+              <a:rPr lang="en-US" dirty="0" smtClean="0"/>
+              <a:t>text box and click “Highlight </a:t>
+            </a:r>
+            <a:r>
+              <a:rPr lang="en-US" dirty="0" smtClean="0"/>
+              <a:t>Points”</a:t>
+            </a:r>
+            <a:endParaRPr lang="en-SG" dirty="0"/>
+          </a:p>
+        </p:txBody>
+      </p:sp>
+    </p:spTree>
+    <p:extLst>
+      <p:ext uri="{BB962C8B-B14F-4D97-AF65-F5344CB8AC3E}">
+        <p14:creationId xmlns:p14="http://schemas.microsoft.com/office/powerpoint/2010/main" val="1166666162"/>
+      </p:ext>
+    </p:extLst>
+  </p:cSld>
+  <p:clrMapOvr>
+    <a:masterClrMapping/>
+  </p:clrMapOvr>
+  <p:timing>
+    <p:tnLst>
+      <p:par>
+        <p:cTn id="1" dur="indefinite" restart="never" nodeType="tmRoot"/>
+      </p:par>
+    </p:tnLst>
+  </p:timing>
+</p:sld>
+</file>
+
+<file path=ppt/slides/slide22.xml><?xml version="1.0" encoding="utf-8"?>
+<p:sld xmlns:a="http://schemas.openxmlformats.org/drawingml/2006/main" xmlns:r="http://schemas.openxmlformats.org/officeDocument/2006/relationships" xmlns:p="http://schemas.openxmlformats.org/presentationml/2006/main">
+  <p:cSld>
+    <p:spTree>
+      <p:nvGrpSpPr>
+        <p:cNvPr id="1" name=""/>
+        <p:cNvGrpSpPr/>
+        <p:nvPr/>
+      </p:nvGrpSpPr>
+      <p:grpSpPr>
+        <a:xfrm>
+          <a:off x="0" y="0"/>
+          <a:ext cx="0" cy="0"/>
+          <a:chOff x="0" y="0"/>
+          <a:chExt cx="0" cy="0"/>
+        </a:xfrm>
+      </p:grpSpPr>
+      <p:sp>
+        <p:nvSpPr>
+          <p:cNvPr id="3" name="Rectangle 4"/>
+          <p:cNvSpPr/>
+          <p:nvPr/>
+        </p:nvSpPr>
+        <p:spPr>
+          <a:xfrm>
+            <a:off x="0" y="2286000"/>
+            <a:ext cx="9144000" cy="2209800"/>
+          </a:xfrm>
+          <a:prstGeom prst="rect">
+            <a:avLst/>
+          </a:prstGeom>
+          <a:solidFill>
+            <a:srgbClr val="002060"/>
+          </a:solidFill>
+        </p:spPr>
+        <p:style>
+          <a:lnRef idx="2">
+            <a:schemeClr val="accent1">
+              <a:shade val="50000"/>
+            </a:schemeClr>
+          </a:lnRef>
+          <a:fillRef idx="1">
+            <a:schemeClr val="accent1"/>
+          </a:fillRef>
+          <a:effectRef idx="0">
+            <a:schemeClr val="accent1"/>
+          </a:effectRef>
+          <a:fontRef idx="minor">
+            <a:schemeClr val="lt1"/>
+          </a:fontRef>
+        </p:style>
+        <p:txBody>
+          <a:bodyPr rtlCol="0" anchor="ctr"/>
+          <a:lstStyle/>
+          <a:p>
+            <a:pPr algn="ctr"/>
+            <a:endParaRPr lang="en-US"/>
+          </a:p>
+        </p:txBody>
+      </p:sp>
+      <p:sp>
+        <p:nvSpPr>
+          <p:cNvPr id="2" name="First Textbox"/>
+          <p:cNvSpPr txBox="1"/>
+          <p:nvPr/>
+        </p:nvSpPr>
+        <p:spPr>
+          <a:xfrm>
+            <a:off x="762000" y="533400"/>
+            <a:ext cx="7620000" cy="5909310"/>
+          </a:xfrm>
+          <a:prstGeom prst="rect">
+            <a:avLst/>
+          </a:prstGeom>
+          <a:noFill/>
+        </p:spPr>
+        <p:txBody>
+          <a:bodyPr wrap="square" rtlCol="0">
+            <a:spAutoFit/>
+          </a:bodyPr>
+          <a:lstStyle/>
+          <a:p>
+            <a:pPr marL="285750" indent="-285750">
+              <a:buFont typeface="Arial" panose="020B0604020202020204" pitchFamily="34" charset="0"/>
+              <a:buChar char="•"/>
+            </a:pPr>
+            <a:r>
+              <a:rPr lang="en-US" sz="2800" dirty="0" smtClean="0"/>
+              <a:t>Test - Non-ABC: 1234567890!@#$%^&amp;*()</a:t>
+            </a:r>
+          </a:p>
+          <a:p>
+            <a:r>
+              <a:rPr lang="en-US" sz="2800" dirty="0"/>
+              <a:t>Test </a:t>
+            </a:r>
+            <a:r>
+              <a:rPr lang="en-US" sz="2800" dirty="0" smtClean="0"/>
+              <a:t>– No bullet point</a:t>
+            </a:r>
+            <a:endParaRPr lang="en-US" sz="2800" dirty="0"/>
+          </a:p>
+          <a:p>
+            <a:pPr marL="514350" indent="-514350">
+              <a:buFont typeface="+mj-lt"/>
+              <a:buAutoNum type="arabicPeriod"/>
+            </a:pPr>
+            <a:r>
+              <a:rPr lang="en-US" sz="2800" dirty="0"/>
+              <a:t>Test – </a:t>
+            </a:r>
+            <a:r>
+              <a:rPr lang="en-US" sz="2800" dirty="0" smtClean="0"/>
+              <a:t>Different bullet point</a:t>
+            </a:r>
+          </a:p>
+          <a:p>
+            <a:pPr marL="285750" indent="-285750">
+              <a:buFont typeface="Arial" panose="020B0604020202020204" pitchFamily="34" charset="0"/>
+              <a:buChar char="•"/>
+            </a:pPr>
+            <a:r>
+              <a:rPr lang="en-US" sz="2800" dirty="0" smtClean="0">
+                <a:latin typeface="Times New Roman" panose="02020603050405020304" pitchFamily="18" charset="0"/>
+                <a:cs typeface="Times New Roman" panose="02020603050405020304" pitchFamily="18" charset="0"/>
+              </a:rPr>
+              <a:t>Test - Another Font Family, using Times New Roman</a:t>
+            </a:r>
+          </a:p>
+          <a:p>
+            <a:pPr marL="285750" indent="-285750">
+              <a:buFont typeface="Arial" panose="020B0604020202020204" pitchFamily="34" charset="0"/>
+              <a:buChar char="•"/>
+            </a:pPr>
+            <a:r>
+              <a:rPr lang="en-US" sz="1000" dirty="0" smtClean="0"/>
+              <a:t>Test - very small content. Test: very small content. Test: very small content. Test: very small content</a:t>
+            </a:r>
+          </a:p>
+          <a:p>
+            <a:pPr marL="285750" indent="-285750">
+              <a:buFont typeface="Arial" panose="020B0604020202020204" pitchFamily="34" charset="0"/>
+              <a:buChar char="•"/>
+            </a:pPr>
+            <a:r>
+              <a:rPr lang="en-US" sz="6600" dirty="0" smtClean="0">
+                <a:latin typeface="Arial Black" panose="020B0A04020102020204" pitchFamily="34" charset="0"/>
+              </a:rPr>
+              <a:t>Test - very big</a:t>
+            </a:r>
+          </a:p>
+          <a:p>
+            <a:pPr marL="285750" indent="-285750">
+              <a:buFont typeface="Arial" panose="020B0604020202020204" pitchFamily="34" charset="0"/>
+              <a:buChar char="•"/>
+            </a:pPr>
+            <a:r>
+              <a:rPr lang="en-US" sz="3600" dirty="0" smtClean="0"/>
+              <a:t>Test – Long sentence: </a:t>
+            </a:r>
+            <a:r>
+              <a:rPr lang="en-US" sz="3600" dirty="0" err="1" smtClean="0"/>
+              <a:t>Asdddd</a:t>
+            </a:r>
+            <a:r>
+              <a:rPr lang="en-US" sz="3600" dirty="0" smtClean="0"/>
+              <a:t> </a:t>
+            </a:r>
+            <a:r>
+              <a:rPr lang="en-US" sz="3600" dirty="0" err="1" smtClean="0"/>
+              <a:t>ddd</a:t>
+            </a:r>
+            <a:r>
+              <a:rPr lang="en-US" sz="3600" dirty="0" smtClean="0"/>
+              <a:t> </a:t>
+            </a:r>
+            <a:r>
+              <a:rPr lang="en-US" sz="3600" dirty="0" err="1" smtClean="0"/>
+              <a:t>dd</a:t>
+            </a:r>
+            <a:r>
+              <a:rPr lang="en-US" sz="3600" dirty="0" smtClean="0"/>
+              <a:t> d </a:t>
+            </a:r>
+            <a:r>
+              <a:rPr lang="en-US" sz="3600" dirty="0" err="1" smtClean="0"/>
+              <a:t>ddddd</a:t>
+            </a:r>
+            <a:r>
+              <a:rPr lang="en-US" sz="3600" dirty="0" smtClean="0"/>
+              <a:t> </a:t>
+            </a:r>
+            <a:r>
+              <a:rPr lang="en-US" sz="3600" dirty="0" err="1" smtClean="0"/>
+              <a:t>ddd</a:t>
+            </a:r>
+            <a:r>
+              <a:rPr lang="en-US" sz="3600" dirty="0" smtClean="0"/>
+              <a:t> </a:t>
+            </a:r>
+            <a:r>
+              <a:rPr lang="en-US" sz="3600" dirty="0" err="1" smtClean="0"/>
+              <a:t>ddd</a:t>
+            </a:r>
+            <a:r>
+              <a:rPr lang="en-US" sz="3600" dirty="0" smtClean="0"/>
+              <a:t> </a:t>
+            </a:r>
+            <a:r>
+              <a:rPr lang="en-US" sz="3600" dirty="0" err="1" smtClean="0"/>
+              <a:t>ddd</a:t>
+            </a:r>
+            <a:r>
+              <a:rPr lang="en-US" sz="3600" dirty="0" smtClean="0"/>
+              <a:t> </a:t>
+            </a:r>
+            <a:r>
+              <a:rPr lang="en-US" sz="3600" dirty="0" err="1" smtClean="0"/>
+              <a:t>ddd</a:t>
+            </a:r>
+            <a:r>
+              <a:rPr lang="en-US" sz="3600" dirty="0" smtClean="0"/>
+              <a:t> </a:t>
+            </a:r>
+            <a:r>
+              <a:rPr lang="en-US" sz="3600" dirty="0" err="1" smtClean="0"/>
+              <a:t>ddd</a:t>
+            </a:r>
+            <a:r>
+              <a:rPr lang="en-US" sz="3600" dirty="0" smtClean="0"/>
+              <a:t> </a:t>
+            </a:r>
+            <a:r>
+              <a:rPr lang="en-US" sz="3600" dirty="0" err="1" smtClean="0"/>
+              <a:t>ddd</a:t>
+            </a:r>
+            <a:r>
+              <a:rPr lang="en-US" sz="3600" dirty="0" smtClean="0"/>
+              <a:t> </a:t>
+            </a:r>
+            <a:r>
+              <a:rPr lang="en-US" sz="3600" dirty="0" err="1" smtClean="0"/>
+              <a:t>ddd</a:t>
+            </a:r>
+            <a:r>
+              <a:rPr lang="en-US" sz="3600" dirty="0" smtClean="0"/>
+              <a:t> </a:t>
+            </a:r>
+            <a:r>
+              <a:rPr lang="en-US" sz="3600" dirty="0" err="1" smtClean="0"/>
+              <a:t>dddddd</a:t>
+            </a:r>
+            <a:r>
+              <a:rPr lang="en-US" sz="3600" dirty="0" smtClean="0"/>
+              <a:t> </a:t>
+            </a:r>
+            <a:r>
+              <a:rPr lang="en-US" sz="3600" dirty="0" err="1" smtClean="0"/>
+              <a:t>dd</a:t>
+            </a:r>
+            <a:r>
+              <a:rPr lang="en-US" sz="3600" dirty="0" smtClean="0"/>
+              <a:t> </a:t>
+            </a:r>
+            <a:r>
+              <a:rPr lang="en-US" sz="3600" dirty="0" err="1" smtClean="0"/>
+              <a:t>ddd</a:t>
+            </a:r>
+            <a:r>
+              <a:rPr lang="en-US" sz="3600" dirty="0" smtClean="0"/>
+              <a:t> </a:t>
+            </a:r>
+            <a:r>
+              <a:rPr lang="en-US" sz="3600" dirty="0" err="1" smtClean="0"/>
+              <a:t>ddddd</a:t>
+            </a:r>
+            <a:r>
+              <a:rPr lang="en-US" sz="3600" dirty="0" smtClean="0"/>
+              <a:t> </a:t>
+            </a:r>
+            <a:r>
+              <a:rPr lang="en-US" sz="3600" dirty="0" err="1" smtClean="0"/>
+              <a:t>dd</a:t>
+            </a:r>
+            <a:r>
+              <a:rPr lang="en-US" sz="3600" dirty="0" smtClean="0"/>
+              <a:t> </a:t>
+            </a:r>
+            <a:r>
+              <a:rPr lang="en-US" sz="3600" dirty="0" err="1" smtClean="0"/>
+              <a:t>dd</a:t>
+            </a:r>
+            <a:r>
+              <a:rPr lang="en-US" sz="3600" dirty="0" smtClean="0"/>
+              <a:t> d </a:t>
+            </a:r>
+            <a:r>
+              <a:rPr lang="en-US" sz="3600" dirty="0" err="1" smtClean="0"/>
+              <a:t>ddd</a:t>
+            </a:r>
+            <a:r>
+              <a:rPr lang="en-US" sz="3600" dirty="0" smtClean="0"/>
+              <a:t> </a:t>
+            </a:r>
+            <a:r>
+              <a:rPr lang="en-US" sz="3600" dirty="0" err="1" smtClean="0"/>
+              <a:t>ddd</a:t>
+            </a:r>
+            <a:endParaRPr lang="en-US" sz="3600" dirty="0" smtClean="0"/>
+          </a:p>
+          <a:p>
+            <a:pPr marL="285750" indent="-285750">
+              <a:buFont typeface="Arial" panose="020B0604020202020204" pitchFamily="34" charset="0"/>
+              <a:buChar char="•"/>
+            </a:pPr>
+            <a:r>
+              <a:rPr lang="en-US" altLang="zh-CN" dirty="0" smtClean="0"/>
+              <a:t>Test – Chinese Characters: </a:t>
+            </a:r>
+            <a:r>
+              <a:rPr lang="zh-CN" altLang="en-US" dirty="0" smtClean="0"/>
+              <a:t>阿</a:t>
+            </a:r>
+            <a:r>
+              <a:rPr lang="zh-CN" altLang="en-US" dirty="0"/>
+              <a:t>斯</a:t>
+            </a:r>
+            <a:r>
+              <a:rPr lang="zh-CN" altLang="en-US" dirty="0" smtClean="0"/>
+              <a:t>顿啊盛大速度啊盛大速度啊盛大速度</a:t>
+            </a:r>
+            <a:endParaRPr lang="en-SG" dirty="0"/>
+          </a:p>
+        </p:txBody>
+      </p:sp>
+    </p:spTree>
+    <p:extLst>
+      <p:ext uri="{BB962C8B-B14F-4D97-AF65-F5344CB8AC3E}">
+        <p14:creationId xmlns:p14="http://schemas.microsoft.com/office/powerpoint/2010/main" val="2096991230"/>
+      </p:ext>
+    </p:extLst>
+  </p:cSld>
+  <p:clrMapOvr>
+    <a:masterClrMapping/>
+  </p:clrMapOvr>
+  <p:transition spd="slow">
+    <p:push dir="u"/>
+  </p:transition>
+  <p:timing>
+    <p:tnLst>
+      <p:par>
+        <p:cTn id="1" dur="indefinite" restart="never" nodeType="tmRoot"/>
+      </p:par>
+    </p:tnLst>
+  </p:timing>
+</p:sld>
+</file>
+
+<file path=ppt/slides/slide23.xml><?xml version="1.0" encoding="utf-8"?>
+<p:sld xmlns:a="http://schemas.openxmlformats.org/drawingml/2006/main" xmlns:r="http://schemas.openxmlformats.org/officeDocument/2006/relationships" xmlns:p="http://schemas.openxmlformats.org/presentationml/2006/main">
+  <p:cSld name="PPTLabsHighlightBulletsSlide201702070026288891">
+    <p:spTree>
+      <p:nvGrpSpPr>
+        <p:cNvPr id="1" name=""/>
+        <p:cNvGrpSpPr/>
+        <p:nvPr/>
+      </p:nvGrpSpPr>
+      <p:grpSpPr>
+        <a:xfrm>
+          <a:off x="0" y="0"/>
+          <a:ext cx="0" cy="0"/>
+          <a:chOff x="0" y="0"/>
+          <a:chExt cx="0" cy="0"/>
+        </a:xfrm>
+      </p:grpSpPr>
+      <p:sp>
+        <p:nvSpPr>
+          <p:cNvPr id="3" name="Rectangle 4"/>
+          <p:cNvSpPr/>
+          <p:nvPr/>
+        </p:nvSpPr>
+        <p:spPr>
+          <a:xfrm>
+            <a:off x="0" y="2286000"/>
+            <a:ext cx="9144000" cy="2209800"/>
+          </a:xfrm>
+          <a:prstGeom prst="rect">
+            <a:avLst/>
+          </a:prstGeom>
+          <a:solidFill>
+            <a:srgbClr val="002060"/>
+          </a:solidFill>
+        </p:spPr>
+        <p:style>
+          <a:lnRef idx="2">
+            <a:schemeClr val="accent1">
+              <a:shade val="50000"/>
+            </a:schemeClr>
+          </a:lnRef>
+          <a:fillRef idx="1">
+            <a:schemeClr val="accent1"/>
+          </a:fillRef>
+          <a:effectRef idx="0">
+            <a:schemeClr val="accent1"/>
+          </a:effectRef>
+          <a:fontRef idx="minor">
+            <a:schemeClr val="lt1"/>
+          </a:fontRef>
+        </p:style>
+        <p:txBody>
+          <a:bodyPr rtlCol="0" anchor="ctr"/>
+          <a:lstStyle/>
+          <a:p>
+            <a:pPr algn="ctr"/>
+            <a:endParaRPr lang="en-US"/>
+          </a:p>
+        </p:txBody>
+      </p:sp>
+      <p:sp>
+        <p:nvSpPr>
+          <p:cNvPr id="2" name="HighlightTextShape201702070026289237"/>
+          <p:cNvSpPr txBox="1"/>
+          <p:nvPr/>
+        </p:nvSpPr>
+        <p:spPr>
+          <a:xfrm>
+            <a:off x="762000" y="533400"/>
+            <a:ext cx="7620000" cy="5909310"/>
+          </a:xfrm>
+          <a:prstGeom prst="rect">
+            <a:avLst/>
+          </a:prstGeom>
+          <a:noFill/>
+        </p:spPr>
+        <p:txBody>
+          <a:bodyPr wrap="square" rtlCol="0">
+            <a:spAutoFit/>
+          </a:bodyPr>
+          <a:lstStyle/>
+          <a:p>
+            <a:pPr marL="285750" indent="-285750">
+              <a:buFont typeface="Arial" panose="020B0604020202020204" pitchFamily="34" charset="0"/>
+              <a:buChar char="•"/>
+            </a:pPr>
+            <a:r>
+              <a:rPr lang="en-US" sz="2800" dirty="0" smtClean="0"/>
+              <a:t>Test - Non-ABC: 1234567890!@#$%^&amp;*()</a:t>
+            </a:r>
+          </a:p>
+          <a:p>
+            <a:r>
+              <a:rPr lang="en-US" sz="2800" dirty="0"/>
+              <a:t>Test </a:t>
+            </a:r>
+            <a:r>
+              <a:rPr lang="en-US" sz="2800" dirty="0" smtClean="0"/>
+              <a:t>– No bullet point</a:t>
+            </a:r>
+            <a:endParaRPr lang="en-US" sz="2800" dirty="0"/>
+          </a:p>
+          <a:p>
+            <a:pPr marL="514350" indent="-514350">
+              <a:buFont typeface="+mj-lt"/>
+              <a:buAutoNum type="arabicPeriod"/>
+            </a:pPr>
+            <a:r>
+              <a:rPr lang="en-US" sz="2800" dirty="0"/>
+              <a:t>Test – </a:t>
+            </a:r>
+            <a:r>
+              <a:rPr lang="en-US" sz="2800" dirty="0" smtClean="0"/>
+              <a:t>Different bullet point</a:t>
+            </a:r>
+          </a:p>
+          <a:p>
+            <a:pPr marL="285750" indent="-285750">
+              <a:buFont typeface="Arial" panose="020B0604020202020204" pitchFamily="34" charset="0"/>
+              <a:buChar char="•"/>
+            </a:pPr>
+            <a:r>
+              <a:rPr lang="en-US" sz="2800" dirty="0" smtClean="0">
+                <a:latin typeface="Times New Roman" panose="02020603050405020304" pitchFamily="18" charset="0"/>
+                <a:cs typeface="Times New Roman" panose="02020603050405020304" pitchFamily="18" charset="0"/>
+              </a:rPr>
+              <a:t>Test - Another Font Family, using Times New Roman</a:t>
+            </a:r>
+          </a:p>
+          <a:p>
+            <a:pPr marL="285750" indent="-285750">
+              <a:buFont typeface="Arial" panose="020B0604020202020204" pitchFamily="34" charset="0"/>
+              <a:buChar char="•"/>
+            </a:pPr>
+            <a:r>
+              <a:rPr lang="en-US" sz="1000" dirty="0" smtClean="0"/>
+              <a:t>Test - very small content. Test: very small content. Test: very small content. Test: very small content</a:t>
+            </a:r>
+          </a:p>
+          <a:p>
+            <a:pPr marL="285750" indent="-285750">
+              <a:buFont typeface="Arial" panose="020B0604020202020204" pitchFamily="34" charset="0"/>
+              <a:buChar char="•"/>
+            </a:pPr>
+            <a:r>
+              <a:rPr lang="en-US" sz="6600" dirty="0" smtClean="0">
+                <a:latin typeface="Arial Black" panose="020B0A04020102020204" pitchFamily="34" charset="0"/>
+              </a:rPr>
+              <a:t>Test - very big</a:t>
+            </a:r>
+          </a:p>
+          <a:p>
+            <a:pPr marL="285750" indent="-285750">
+              <a:buFont typeface="Arial" panose="020B0604020202020204" pitchFamily="34" charset="0"/>
+              <a:buChar char="•"/>
+            </a:pPr>
+            <a:r>
+              <a:rPr lang="en-US" sz="3600" dirty="0" smtClean="0"/>
+              <a:t>Test – Long sentence: </a:t>
+            </a:r>
+            <a:r>
+              <a:rPr lang="en-US" sz="3600" dirty="0" err="1" smtClean="0"/>
+              <a:t>Asdddd</a:t>
+            </a:r>
+            <a:r>
+              <a:rPr lang="en-US" sz="3600" dirty="0" smtClean="0"/>
+              <a:t> </a:t>
+            </a:r>
+            <a:r>
+              <a:rPr lang="en-US" sz="3600" dirty="0" err="1" smtClean="0"/>
+              <a:t>ddd</a:t>
+            </a:r>
+            <a:r>
+              <a:rPr lang="en-US" sz="3600" dirty="0" smtClean="0"/>
+              <a:t> </a:t>
+            </a:r>
+            <a:r>
+              <a:rPr lang="en-US" sz="3600" dirty="0" err="1" smtClean="0"/>
+              <a:t>dd</a:t>
+            </a:r>
+            <a:r>
+              <a:rPr lang="en-US" sz="3600" dirty="0" smtClean="0"/>
+              <a:t> d </a:t>
+            </a:r>
+            <a:r>
+              <a:rPr lang="en-US" sz="3600" dirty="0" err="1" smtClean="0"/>
+              <a:t>ddddd</a:t>
+            </a:r>
+            <a:r>
+              <a:rPr lang="en-US" sz="3600" dirty="0" smtClean="0"/>
+              <a:t> </a:t>
+            </a:r>
+            <a:r>
+              <a:rPr lang="en-US" sz="3600" dirty="0" err="1" smtClean="0"/>
+              <a:t>ddd</a:t>
+            </a:r>
+            <a:r>
+              <a:rPr lang="en-US" sz="3600" dirty="0" smtClean="0"/>
+              <a:t> </a:t>
+            </a:r>
+            <a:r>
+              <a:rPr lang="en-US" sz="3600" dirty="0" err="1" smtClean="0"/>
+              <a:t>ddd</a:t>
+            </a:r>
+            <a:r>
+              <a:rPr lang="en-US" sz="3600" dirty="0" smtClean="0"/>
+              <a:t> </a:t>
+            </a:r>
+            <a:r>
+              <a:rPr lang="en-US" sz="3600" dirty="0" err="1" smtClean="0"/>
+              <a:t>ddd</a:t>
+            </a:r>
+            <a:r>
+              <a:rPr lang="en-US" sz="3600" dirty="0" smtClean="0"/>
+              <a:t> </a:t>
+            </a:r>
+            <a:r>
+              <a:rPr lang="en-US" sz="3600" dirty="0" err="1" smtClean="0"/>
+              <a:t>ddd</a:t>
+            </a:r>
+            <a:r>
+              <a:rPr lang="en-US" sz="3600" dirty="0" smtClean="0"/>
+              <a:t> </a:t>
+            </a:r>
+            <a:r>
+              <a:rPr lang="en-US" sz="3600" dirty="0" err="1" smtClean="0"/>
+              <a:t>ddd</a:t>
+            </a:r>
+            <a:r>
+              <a:rPr lang="en-US" sz="3600" dirty="0" smtClean="0"/>
+              <a:t> </a:t>
+            </a:r>
+            <a:r>
+              <a:rPr lang="en-US" sz="3600" dirty="0" err="1" smtClean="0"/>
+              <a:t>ddd</a:t>
+            </a:r>
+            <a:r>
+              <a:rPr lang="en-US" sz="3600" dirty="0" smtClean="0"/>
+              <a:t> </a:t>
+            </a:r>
+            <a:r>
+              <a:rPr lang="en-US" sz="3600" dirty="0" err="1" smtClean="0"/>
+              <a:t>ddd</a:t>
+            </a:r>
+            <a:r>
+              <a:rPr lang="en-US" sz="3600" dirty="0" smtClean="0"/>
+              <a:t> </a:t>
+            </a:r>
+            <a:r>
+              <a:rPr lang="en-US" sz="3600" dirty="0" err="1" smtClean="0"/>
+              <a:t>dddddd</a:t>
+            </a:r>
+            <a:r>
+              <a:rPr lang="en-US" sz="3600" dirty="0" smtClean="0"/>
+              <a:t> </a:t>
+            </a:r>
+            <a:r>
+              <a:rPr lang="en-US" sz="3600" dirty="0" err="1" smtClean="0"/>
+              <a:t>dd</a:t>
+            </a:r>
+            <a:r>
+              <a:rPr lang="en-US" sz="3600" dirty="0" smtClean="0"/>
+              <a:t> </a:t>
+            </a:r>
+            <a:r>
+              <a:rPr lang="en-US" sz="3600" dirty="0" err="1" smtClean="0"/>
+              <a:t>ddd</a:t>
+            </a:r>
+            <a:r>
+              <a:rPr lang="en-US" sz="3600" dirty="0" smtClean="0"/>
+              <a:t> </a:t>
+            </a:r>
+            <a:r>
+              <a:rPr lang="en-US" sz="3600" dirty="0" err="1" smtClean="0"/>
+              <a:t>ddddd</a:t>
+            </a:r>
+            <a:r>
+              <a:rPr lang="en-US" sz="3600" dirty="0" smtClean="0"/>
+              <a:t> </a:t>
+            </a:r>
+            <a:r>
+              <a:rPr lang="en-US" sz="3600" dirty="0" err="1" smtClean="0"/>
+              <a:t>dd</a:t>
+            </a:r>
+            <a:r>
+              <a:rPr lang="en-US" sz="3600" dirty="0" smtClean="0"/>
+              <a:t> </a:t>
+            </a:r>
+            <a:r>
+              <a:rPr lang="en-US" sz="3600" dirty="0" err="1" smtClean="0"/>
+              <a:t>dd</a:t>
+            </a:r>
+            <a:r>
+              <a:rPr lang="en-US" sz="3600" dirty="0" smtClean="0"/>
+              <a:t> d </a:t>
+            </a:r>
+            <a:r>
+              <a:rPr lang="en-US" sz="3600" dirty="0" err="1" smtClean="0"/>
+              <a:t>ddd</a:t>
+            </a:r>
+            <a:r>
+              <a:rPr lang="en-US" sz="3600" dirty="0" smtClean="0"/>
+              <a:t> </a:t>
+            </a:r>
+            <a:r>
+              <a:rPr lang="en-US" sz="3600" dirty="0" err="1" smtClean="0"/>
+              <a:t>ddd</a:t>
+            </a:r>
+            <a:endParaRPr lang="en-US" sz="3600" dirty="0" smtClean="0"/>
+          </a:p>
+          <a:p>
+            <a:pPr marL="285750" indent="-285750">
+              <a:buFont typeface="Arial" panose="020B0604020202020204" pitchFamily="34" charset="0"/>
+              <a:buChar char="•"/>
+            </a:pPr>
+            <a:r>
+              <a:rPr lang="en-US" altLang="zh-CN" dirty="0" smtClean="0"/>
+              <a:t>Test – Chinese Characters: </a:t>
+            </a:r>
+            <a:r>
+              <a:rPr lang="zh-CN" altLang="en-US" dirty="0" smtClean="0"/>
+              <a:t>阿</a:t>
+            </a:r>
+            <a:r>
+              <a:rPr lang="zh-CN" altLang="en-US" dirty="0"/>
+              <a:t>斯</a:t>
+            </a:r>
+            <a:r>
+              <a:rPr lang="zh-CN" altLang="en-US" dirty="0" smtClean="0"/>
+              <a:t>顿啊盛大速度啊盛大速度啊盛大速度</a:t>
+            </a:r>
+            <a:endParaRPr lang="en-SG" dirty="0"/>
+          </a:p>
+        </p:txBody>
+      </p:sp>
+    </p:spTree>
+    <p:extLst>
+      <p:ext uri="{BB962C8B-B14F-4D97-AF65-F5344CB8AC3E}">
+        <p14:creationId xmlns:p14="http://schemas.microsoft.com/office/powerpoint/2010/main" val="2521869913"/>
+      </p:ext>
+    </p:extLst>
+  </p:cSld>
+  <p:clrMapOvr>
+    <a:masterClrMapping/>
+  </p:clrMapOvr>
+  <p:transition spd="slow">
+    <p:push dir="u"/>
+  </p:transition>
+  <p:timing>
+    <p:tnLst>
+      <p:par>
+        <p:cTn id="1" dur="indefinite" restart="never" nodeType="tmRoot">
+          <p:childTnLst>
+            <p:seq concurrent="1" nextAc="seek">
+              <p:cTn id="2" dur="indefinite" nodeType="mainSeq">
+                <p:childTnLst>
+                  <p:par>
+                    <p:cTn id="3" fill="hold">
+                      <p:stCondLst>
+                        <p:cond delay="indefinite"/>
+                      </p:stCondLst>
+                      <p:childTnLst>
+                        <p:par>
+                          <p:cTn id="4" fill="hold">
+                            <p:stCondLst>
+                              <p:cond delay="0"/>
+                            </p:stCondLst>
+                            <p:childTnLst>
+                              <p:par>
+                                <p:cTn id="5" presetID="3" presetClass="emph" presetSubtype="2" fill="hold" grpId="0" nodeType="clickEffect">
+                                  <p:stCondLst>
+                                    <p:cond delay="100"/>
+                                  </p:stCondLst>
+                                  <p:childTnLst>
+                                    <p:animClr clrSpc="rgb" dir="cw">
+                                      <p:cBhvr override="childStyle">
+                                        <p:cTn id="6" dur="100" fill="hold"/>
+                                        <p:tgtEl>
+                                          <p:spTgt spid="2">
+                                            <p:txEl>
+                                              <p:pRg st="7" end="7"/>
+                                            </p:txEl>
+                                          </p:spTgt>
+                                        </p:tgtEl>
+                                        <p:attrNameLst>
+                                          <p:attrName>style.color</p:attrName>
+                                        </p:attrNameLst>
+                                      </p:cBhvr>
+                                      <p:to>
+                                        <a:srgbClr val="F2290A"/>
+                                      </p:to>
+                                    </p:animClr>
+                                  </p:childTnLst>
+                                </p:cTn>
+                              </p:par>
+                            </p:childTnLst>
+                          </p:cTn>
+                        </p:par>
+                      </p:childTnLst>
+                    </p:cTn>
+                  </p:par>
+                  <p:par>
+                    <p:cTn id="7" fill="hold">
+                      <p:stCondLst>
+                        <p:cond delay="indefinite"/>
+                      </p:stCondLst>
+                      <p:childTnLst>
+                        <p:par>
+                          <p:cTn id="8" fill="hold">
+                            <p:stCondLst>
+                              <p:cond delay="0"/>
+                            </p:stCondLst>
+                            <p:childTnLst>
+                              <p:par>
+                                <p:cTn id="9" presetID="3" presetClass="emph" presetSubtype="2" fill="hold" grpId="1" nodeType="clickEffect">
+                                  <p:stCondLst>
+                                    <p:cond delay="100"/>
+                                  </p:stCondLst>
+                                  <p:childTnLst>
+                                    <p:animClr clrSpc="rgb" dir="cw">
+                                      <p:cBhvr override="childStyle">
+                                        <p:cTn id="10" dur="100" fill="hold"/>
+                                        <p:tgtEl>
+                                          <p:spTgt spid="2">
+                                            <p:txEl>
+                                              <p:pRg st="7" end="7"/>
+                                            </p:txEl>
+                                          </p:spTgt>
+                                        </p:tgtEl>
+                                        <p:attrNameLst>
+                                          <p:attrName>style.color</p:attrName>
+                                        </p:attrNameLst>
+                                      </p:cBhvr>
+                                      <p:to>
+                                        <a:srgbClr val="000000"/>
+                                      </p:to>
+                                    </p:animClr>
+                                  </p:childTnLst>
+                                </p:cTn>
+                              </p:par>
+                            </p:childTnLst>
+                          </p:cTn>
+                        </p:par>
+                      </p:childTnLst>
+                    </p:cTn>
+                  </p:par>
+                </p:childTnLst>
+              </p:cTn>
+              <p:prevCondLst>
+                <p:cond evt="onPrev" delay="0">
+                  <p:tgtEl>
+                    <p:sldTgt/>
+                  </p:tgtEl>
+                </p:cond>
+              </p:prevCondLst>
+              <p:nextCondLst>
+                <p:cond evt="onNext" delay="0">
+                  <p:tgtEl>
+                    <p:sldTgt/>
+                  </p:tgtEl>
+                </p:cond>
+              </p:nextCondLst>
+            </p:seq>
+          </p:childTnLst>
+        </p:cTn>
+      </p:par>
+    </p:tnLst>
+    <p:bldLst>
+      <p:bldP spid="2" grpId="0" build="p" bldLvl="5"/>
+      <p:bldP spid="2" grpId="1" build="p" bldLvl="5"/>
+    </p:bldLst>
+  </p:timing>
+</p:sld>
+</file>
+
+<file path=ppt/slides/slide24.xml><?xml version="1.0" encoding="utf-8"?>
 <p:sld xmlns:a="http://schemas.openxmlformats.org/drawingml/2006/main" xmlns:r="http://schemas.openxmlformats.org/officeDocument/2006/relationships" xmlns:p="http://schemas.openxmlformats.org/presentationml/2006/main" show="0">
   <p:cSld name="PPTLabsAcknowledgementSlide">
     <p:spTree>
@@ -22742,7 +23693,7 @@
   <a:extraClrSchemeLst/>
   <a:extLst>
     <a:ext uri="{05A4C25C-085E-4340-85A3-A5531E510DB2}">
-      <thm15:themeFamily xmlns:thm15="http://schemas.microsoft.com/office/thememl/2012/main" xmlns="" name="Office Theme" id="{62F939B6-93AF-4DB8-9C6B-D6C7DFDC589F}" vid="{4A3C46E8-61CC-4603-A589-7422A47A8E4A}"/>
+      <thm15:themeFamily xmlns:thm15="http://schemas.microsoft.com/office/thememl/2012/main" name="Office Theme" id="{62F939B6-93AF-4DB8-9C6B-D6C7DFDC589F}" vid="{4A3C46E8-61CC-4603-A589-7422A47A8E4A}"/>
     </a:ext>
   </a:extLst>
 </a:theme>

</xml_diff>